<commit_message>
a set of new images.
Signed-off-by: Behzad Tabibian <btabibian@gmail.com>
</commit_message>
<xml_diff>
--- a/Movement/Server/visualizations/Figures/Figures.pptx
+++ b/Movement/Server/visualizations/Figures/Figures.pptx
@@ -5,7 +5,7 @@
     <p:sldMasterId id="2147483648" r:id="rId1"/>
   </p:sldMasterIdLst>
   <p:notesMasterIdLst>
-    <p:notesMasterId r:id="rId14"/>
+    <p:notesMasterId r:id="rId15"/>
   </p:notesMasterIdLst>
   <p:sldIdLst>
     <p:sldId id="256" r:id="rId2"/>
@@ -20,6 +20,7 @@
     <p:sldId id="266" r:id="rId11"/>
     <p:sldId id="267" r:id="rId12"/>
     <p:sldId id="268" r:id="rId13"/>
+    <p:sldId id="269" r:id="rId14"/>
   </p:sldIdLst>
   <p:sldSz cx="9144000" cy="6858000" type="screen4x3"/>
   <p:notesSz cx="6858000" cy="9144000"/>
@@ -211,11 +212,11 @@
           <c:showPercent val="0"/>
           <c:showBubbleSize val="0"/>
         </c:dLbls>
-        <c:axId val="95091328"/>
-        <c:axId val="97383552"/>
+        <c:axId val="165708928"/>
+        <c:axId val="165710848"/>
       </c:scatterChart>
       <c:valAx>
-        <c:axId val="95091328"/>
+        <c:axId val="165708928"/>
         <c:scaling>
           <c:orientation val="minMax"/>
           <c:max val="250"/>
@@ -249,12 +250,12 @@
             <a:endParaRPr lang="en-US"/>
           </a:p>
         </c:txPr>
-        <c:crossAx val="97383552"/>
+        <c:crossAx val="165710848"/>
         <c:crosses val="autoZero"/>
         <c:crossBetween val="midCat"/>
       </c:valAx>
       <c:valAx>
-        <c:axId val="97383552"/>
+        <c:axId val="165710848"/>
         <c:scaling>
           <c:orientation val="minMax"/>
           <c:max val="200"/>
@@ -287,7 +288,7 @@
             <a:endParaRPr lang="en-US"/>
           </a:p>
         </c:txPr>
-        <c:crossAx val="95091328"/>
+        <c:crossAx val="165708928"/>
         <c:crosses val="autoZero"/>
         <c:crossBetween val="midCat"/>
       </c:valAx>
@@ -381,11 +382,11 @@
           <c:showPercent val="0"/>
           <c:showBubbleSize val="0"/>
         </c:dLbls>
-        <c:axId val="95037696"/>
-        <c:axId val="95076736"/>
+        <c:axId val="171571072"/>
+        <c:axId val="172769280"/>
       </c:scatterChart>
       <c:valAx>
-        <c:axId val="95037696"/>
+        <c:axId val="171571072"/>
         <c:scaling>
           <c:orientation val="minMax"/>
           <c:max val="260"/>
@@ -422,13 +423,13 @@
             <a:endParaRPr lang="en-US"/>
           </a:p>
         </c:txPr>
-        <c:crossAx val="95076736"/>
+        <c:crossAx val="172769280"/>
         <c:crosses val="autoZero"/>
         <c:crossBetween val="midCat"/>
         <c:majorUnit val="20"/>
       </c:valAx>
       <c:valAx>
-        <c:axId val="95076736"/>
+        <c:axId val="172769280"/>
         <c:scaling>
           <c:orientation val="minMax"/>
           <c:max val="200"/>
@@ -465,7 +466,7 @@
             <a:endParaRPr lang="en-US"/>
           </a:p>
         </c:txPr>
-        <c:crossAx val="95037696"/>
+        <c:crossAx val="171571072"/>
         <c:crosses val="autoZero"/>
         <c:crossBetween val="midCat"/>
         <c:majorUnit val="20"/>
@@ -598,11 +599,11 @@
           <c:showPercent val="0"/>
           <c:showBubbleSize val="0"/>
         </c:dLbls>
-        <c:axId val="76718080"/>
-        <c:axId val="94835072"/>
+        <c:axId val="172792448"/>
+        <c:axId val="172815104"/>
       </c:scatterChart>
       <c:valAx>
-        <c:axId val="76718080"/>
+        <c:axId val="172792448"/>
         <c:scaling>
           <c:orientation val="minMax"/>
           <c:max val="260"/>
@@ -639,13 +640,13 @@
             <a:endParaRPr lang="en-US"/>
           </a:p>
         </c:txPr>
-        <c:crossAx val="94835072"/>
+        <c:crossAx val="172815104"/>
         <c:crosses val="autoZero"/>
         <c:crossBetween val="midCat"/>
         <c:majorUnit val="20"/>
       </c:valAx>
       <c:valAx>
-        <c:axId val="94835072"/>
+        <c:axId val="172815104"/>
         <c:scaling>
           <c:orientation val="minMax"/>
           <c:max val="200"/>
@@ -682,7 +683,7 @@
             <a:endParaRPr lang="en-US"/>
           </a:p>
         </c:txPr>
-        <c:crossAx val="76718080"/>
+        <c:crossAx val="172792448"/>
         <c:crosses val="autoZero"/>
         <c:crossBetween val="midCat"/>
         <c:majorUnit val="20"/>
@@ -832,11 +833,11 @@
           <c:showPercent val="0"/>
           <c:showBubbleSize val="0"/>
         </c:dLbls>
-        <c:axId val="95116288"/>
-        <c:axId val="95152768"/>
+        <c:axId val="172869504"/>
+        <c:axId val="172871680"/>
       </c:scatterChart>
       <c:valAx>
-        <c:axId val="95116288"/>
+        <c:axId val="172869504"/>
         <c:scaling>
           <c:orientation val="minMax"/>
           <c:max val="260"/>
@@ -873,13 +874,13 @@
             <a:endParaRPr lang="en-US"/>
           </a:p>
         </c:txPr>
-        <c:crossAx val="95152768"/>
+        <c:crossAx val="172871680"/>
         <c:crosses val="autoZero"/>
         <c:crossBetween val="midCat"/>
         <c:majorUnit val="20"/>
       </c:valAx>
       <c:valAx>
-        <c:axId val="95152768"/>
+        <c:axId val="172871680"/>
         <c:scaling>
           <c:orientation val="minMax"/>
           <c:max val="200"/>
@@ -916,7 +917,7 @@
             <a:endParaRPr lang="en-US"/>
           </a:p>
         </c:txPr>
-        <c:crossAx val="95116288"/>
+        <c:crossAx val="172869504"/>
         <c:crosses val="autoZero"/>
         <c:crossBetween val="midCat"/>
         <c:majorUnit val="20"/>
@@ -1090,11 +1091,11 @@
           <c:showPercent val="0"/>
           <c:showBubbleSize val="0"/>
         </c:dLbls>
-        <c:axId val="73757056"/>
-        <c:axId val="95089408"/>
+        <c:axId val="172935808"/>
+        <c:axId val="172991232"/>
       </c:scatterChart>
       <c:valAx>
-        <c:axId val="73757056"/>
+        <c:axId val="172935808"/>
         <c:scaling>
           <c:orientation val="minMax"/>
           <c:max val="260"/>
@@ -1131,13 +1132,13 @@
             <a:endParaRPr lang="en-US"/>
           </a:p>
         </c:txPr>
-        <c:crossAx val="95089408"/>
+        <c:crossAx val="172991232"/>
         <c:crosses val="autoZero"/>
         <c:crossBetween val="midCat"/>
         <c:majorUnit val="20"/>
       </c:valAx>
       <c:valAx>
-        <c:axId val="95089408"/>
+        <c:axId val="172991232"/>
         <c:scaling>
           <c:orientation val="minMax"/>
           <c:max val="200"/>
@@ -1174,7 +1175,7 @@
             <a:endParaRPr lang="en-US"/>
           </a:p>
         </c:txPr>
-        <c:crossAx val="73757056"/>
+        <c:crossAx val="172935808"/>
         <c:crosses val="autoZero"/>
         <c:crossBetween val="midCat"/>
         <c:majorUnit val="20"/>
@@ -1372,11 +1373,11 @@
           <c:showPercent val="0"/>
           <c:showBubbleSize val="0"/>
         </c:dLbls>
-        <c:axId val="95135616"/>
-        <c:axId val="97572352"/>
+        <c:axId val="173061632"/>
+        <c:axId val="173063552"/>
       </c:scatterChart>
       <c:valAx>
-        <c:axId val="95135616"/>
+        <c:axId val="173061632"/>
         <c:scaling>
           <c:orientation val="minMax"/>
           <c:max val="260"/>
@@ -1413,13 +1414,13 @@
             <a:endParaRPr lang="en-US"/>
           </a:p>
         </c:txPr>
-        <c:crossAx val="97572352"/>
+        <c:crossAx val="173063552"/>
         <c:crosses val="autoZero"/>
         <c:crossBetween val="midCat"/>
         <c:majorUnit val="20"/>
       </c:valAx>
       <c:valAx>
-        <c:axId val="97572352"/>
+        <c:axId val="173063552"/>
         <c:scaling>
           <c:orientation val="minMax"/>
           <c:max val="200"/>
@@ -1456,7 +1457,7 @@
             <a:endParaRPr lang="en-US"/>
           </a:p>
         </c:txPr>
-        <c:crossAx val="95135616"/>
+        <c:crossAx val="173061632"/>
         <c:crosses val="autoZero"/>
         <c:crossBetween val="midCat"/>
         <c:majorUnit val="20"/>
@@ -1690,11 +1691,11 @@
           <c:showPercent val="0"/>
           <c:showBubbleSize val="0"/>
         </c:dLbls>
-        <c:axId val="97586560"/>
-        <c:axId val="97621888"/>
+        <c:axId val="167883136"/>
+        <c:axId val="167912576"/>
       </c:scatterChart>
       <c:valAx>
-        <c:axId val="97586560"/>
+        <c:axId val="167883136"/>
         <c:scaling>
           <c:orientation val="minMax"/>
           <c:max val="260"/>
@@ -1731,13 +1732,13 @@
             <a:endParaRPr lang="en-US"/>
           </a:p>
         </c:txPr>
-        <c:crossAx val="97621888"/>
+        <c:crossAx val="167912576"/>
         <c:crosses val="autoZero"/>
         <c:crossBetween val="midCat"/>
         <c:majorUnit val="20"/>
       </c:valAx>
       <c:valAx>
-        <c:axId val="97621888"/>
+        <c:axId val="167912576"/>
         <c:scaling>
           <c:orientation val="minMax"/>
           <c:max val="200"/>
@@ -1774,7 +1775,7 @@
             <a:endParaRPr lang="en-US"/>
           </a:p>
         </c:txPr>
-        <c:crossAx val="97586560"/>
+        <c:crossAx val="167883136"/>
         <c:crosses val="autoZero"/>
         <c:crossBetween val="midCat"/>
         <c:majorUnit val="20"/>
@@ -2098,11 +2099,11 @@
           <c:showPercent val="0"/>
           <c:showBubbleSize val="0"/>
         </c:dLbls>
-        <c:axId val="95354240"/>
-        <c:axId val="97514240"/>
+        <c:axId val="168047744"/>
+        <c:axId val="168049664"/>
       </c:scatterChart>
       <c:valAx>
-        <c:axId val="95354240"/>
+        <c:axId val="168047744"/>
         <c:scaling>
           <c:orientation val="minMax"/>
           <c:max val="260"/>
@@ -2139,13 +2140,13 @@
             <a:endParaRPr lang="en-US"/>
           </a:p>
         </c:txPr>
-        <c:crossAx val="97514240"/>
+        <c:crossAx val="168049664"/>
         <c:crosses val="autoZero"/>
         <c:crossBetween val="midCat"/>
         <c:majorUnit val="20"/>
       </c:valAx>
       <c:valAx>
-        <c:axId val="97514240"/>
+        <c:axId val="168049664"/>
         <c:scaling>
           <c:orientation val="minMax"/>
           <c:max val="200"/>
@@ -2182,7 +2183,7 @@
             <a:endParaRPr lang="en-US"/>
           </a:p>
         </c:txPr>
-        <c:crossAx val="95354240"/>
+        <c:crossAx val="168047744"/>
         <c:crosses val="autoZero"/>
         <c:crossBetween val="midCat"/>
         <c:majorUnit val="20"/>
@@ -2336,7 +2337,7 @@
           <a:p>
             <a:fld id="{D3E37B57-5BAF-4760-9133-92883CE5CF4A}" type="datetimeFigureOut">
               <a:rPr lang="en-US" smtClean="0"/>
-              <a:t>3/23/2011</a:t>
+              <a:t>4/18/2011</a:t>
             </a:fld>
             <a:endParaRPr lang="en-US"/>
           </a:p>
@@ -2931,6 +2932,90 @@
     <p:extLst>
       <p:ext uri="{BB962C8B-B14F-4D97-AF65-F5344CB8AC3E}">
         <p14:creationId xmlns:p14="http://schemas.microsoft.com/office/powerpoint/2010/main" val="1336349432"/>
+      </p:ext>
+    </p:extLst>
+  </p:cSld>
+  <p:clrMapOvr>
+    <a:masterClrMapping/>
+  </p:clrMapOvr>
+</p:notes>
+</file>
+
+<file path=ppt/notesSlides/notesSlide13.xml><?xml version="1.0" encoding="utf-8"?>
+<p:notes xmlns:a="http://schemas.openxmlformats.org/drawingml/2006/main" xmlns:r="http://schemas.openxmlformats.org/officeDocument/2006/relationships" xmlns:p="http://schemas.openxmlformats.org/presentationml/2006/main">
+  <p:cSld>
+    <p:spTree>
+      <p:nvGrpSpPr>
+        <p:cNvPr id="1" name=""/>
+        <p:cNvGrpSpPr/>
+        <p:nvPr/>
+      </p:nvGrpSpPr>
+      <p:grpSpPr>
+        <a:xfrm>
+          <a:off x="0" y="0"/>
+          <a:ext cx="0" cy="0"/>
+          <a:chOff x="0" y="0"/>
+          <a:chExt cx="0" cy="0"/>
+        </a:xfrm>
+      </p:grpSpPr>
+      <p:sp>
+        <p:nvSpPr>
+          <p:cNvPr id="2" name="Slide Image Placeholder 1"/>
+          <p:cNvSpPr>
+            <a:spLocks noGrp="1" noRot="1" noChangeAspect="1"/>
+          </p:cNvSpPr>
+          <p:nvPr>
+            <p:ph type="sldImg"/>
+          </p:nvPr>
+        </p:nvSpPr>
+        <p:spPr/>
+      </p:sp>
+      <p:sp>
+        <p:nvSpPr>
+          <p:cNvPr id="3" name="Notes Placeholder 2"/>
+          <p:cNvSpPr>
+            <a:spLocks noGrp="1"/>
+          </p:cNvSpPr>
+          <p:nvPr>
+            <p:ph type="body" idx="1"/>
+          </p:nvPr>
+        </p:nvSpPr>
+        <p:spPr/>
+        <p:txBody>
+          <a:bodyPr/>
+          <a:lstStyle/>
+          <a:p>
+            <a:endParaRPr lang="en-US"/>
+          </a:p>
+        </p:txBody>
+      </p:sp>
+      <p:sp>
+        <p:nvSpPr>
+          <p:cNvPr id="4" name="Slide Number Placeholder 3"/>
+          <p:cNvSpPr>
+            <a:spLocks noGrp="1"/>
+          </p:cNvSpPr>
+          <p:nvPr>
+            <p:ph type="sldNum" sz="quarter" idx="10"/>
+          </p:nvPr>
+        </p:nvSpPr>
+        <p:spPr/>
+        <p:txBody>
+          <a:bodyPr/>
+          <a:lstStyle/>
+          <a:p>
+            <a:fld id="{0E88F9D2-4EE7-4863-A347-7B1A8B83AAAA}" type="slidenum">
+              <a:rPr lang="en-US" smtClean="0"/>
+              <a:t>13</a:t>
+            </a:fld>
+            <a:endParaRPr lang="en-US"/>
+          </a:p>
+        </p:txBody>
+      </p:sp>
+    </p:spTree>
+    <p:extLst>
+      <p:ext uri="{BB962C8B-B14F-4D97-AF65-F5344CB8AC3E}">
+        <p14:creationId xmlns:p14="http://schemas.microsoft.com/office/powerpoint/2010/main" val="3216973166"/>
       </p:ext>
     </p:extLst>
   </p:cSld>
@@ -3793,7 +3878,7 @@
           <a:p>
             <a:fld id="{CAED81F8-A488-4C72-9ED3-50638F28EBFF}" type="datetimeFigureOut">
               <a:rPr lang="en-US" smtClean="0"/>
-              <a:t>3/23/2011</a:t>
+              <a:t>4/18/2011</a:t>
             </a:fld>
             <a:endParaRPr lang="en-US"/>
           </a:p>
@@ -3963,7 +4048,7 @@
           <a:p>
             <a:fld id="{CAED81F8-A488-4C72-9ED3-50638F28EBFF}" type="datetimeFigureOut">
               <a:rPr lang="en-US" smtClean="0"/>
-              <a:t>3/23/2011</a:t>
+              <a:t>4/18/2011</a:t>
             </a:fld>
             <a:endParaRPr lang="en-US"/>
           </a:p>
@@ -4143,7 +4228,7 @@
           <a:p>
             <a:fld id="{CAED81F8-A488-4C72-9ED3-50638F28EBFF}" type="datetimeFigureOut">
               <a:rPr lang="en-US" smtClean="0"/>
-              <a:t>3/23/2011</a:t>
+              <a:t>4/18/2011</a:t>
             </a:fld>
             <a:endParaRPr lang="en-US"/>
           </a:p>
@@ -4313,7 +4398,7 @@
           <a:p>
             <a:fld id="{CAED81F8-A488-4C72-9ED3-50638F28EBFF}" type="datetimeFigureOut">
               <a:rPr lang="en-US" smtClean="0"/>
-              <a:t>3/23/2011</a:t>
+              <a:t>4/18/2011</a:t>
             </a:fld>
             <a:endParaRPr lang="en-US"/>
           </a:p>
@@ -4559,7 +4644,7 @@
           <a:p>
             <a:fld id="{CAED81F8-A488-4C72-9ED3-50638F28EBFF}" type="datetimeFigureOut">
               <a:rPr lang="en-US" smtClean="0"/>
-              <a:t>3/23/2011</a:t>
+              <a:t>4/18/2011</a:t>
             </a:fld>
             <a:endParaRPr lang="en-US"/>
           </a:p>
@@ -4847,7 +4932,7 @@
           <a:p>
             <a:fld id="{CAED81F8-A488-4C72-9ED3-50638F28EBFF}" type="datetimeFigureOut">
               <a:rPr lang="en-US" smtClean="0"/>
-              <a:t>3/23/2011</a:t>
+              <a:t>4/18/2011</a:t>
             </a:fld>
             <a:endParaRPr lang="en-US"/>
           </a:p>
@@ -5269,7 +5354,7 @@
           <a:p>
             <a:fld id="{CAED81F8-A488-4C72-9ED3-50638F28EBFF}" type="datetimeFigureOut">
               <a:rPr lang="en-US" smtClean="0"/>
-              <a:t>3/23/2011</a:t>
+              <a:t>4/18/2011</a:t>
             </a:fld>
             <a:endParaRPr lang="en-US"/>
           </a:p>
@@ -5387,7 +5472,7 @@
           <a:p>
             <a:fld id="{CAED81F8-A488-4C72-9ED3-50638F28EBFF}" type="datetimeFigureOut">
               <a:rPr lang="en-US" smtClean="0"/>
-              <a:t>3/23/2011</a:t>
+              <a:t>4/18/2011</a:t>
             </a:fld>
             <a:endParaRPr lang="en-US"/>
           </a:p>
@@ -5482,7 +5567,7 @@
           <a:p>
             <a:fld id="{CAED81F8-A488-4C72-9ED3-50638F28EBFF}" type="datetimeFigureOut">
               <a:rPr lang="en-US" smtClean="0"/>
-              <a:t>3/23/2011</a:t>
+              <a:t>4/18/2011</a:t>
             </a:fld>
             <a:endParaRPr lang="en-US"/>
           </a:p>
@@ -5759,7 +5844,7 @@
           <a:p>
             <a:fld id="{CAED81F8-A488-4C72-9ED3-50638F28EBFF}" type="datetimeFigureOut">
               <a:rPr lang="en-US" smtClean="0"/>
-              <a:t>3/23/2011</a:t>
+              <a:t>4/18/2011</a:t>
             </a:fld>
             <a:endParaRPr lang="en-US"/>
           </a:p>
@@ -6012,7 +6097,7 @@
           <a:p>
             <a:fld id="{CAED81F8-A488-4C72-9ED3-50638F28EBFF}" type="datetimeFigureOut">
               <a:rPr lang="en-US" smtClean="0"/>
-              <a:t>3/23/2011</a:t>
+              <a:t>4/18/2011</a:t>
             </a:fld>
             <a:endParaRPr lang="en-US"/>
           </a:p>
@@ -6230,7 +6315,7 @@
           <a:p>
             <a:fld id="{CAED81F8-A488-4C72-9ED3-50638F28EBFF}" type="datetimeFigureOut">
               <a:rPr lang="en-US" smtClean="0"/>
-              <a:t>3/23/2011</a:t>
+              <a:t>4/18/2011</a:t>
             </a:fld>
             <a:endParaRPr lang="en-US"/>
           </a:p>
@@ -12935,6 +13020,323 @@
 </p:sld>
 </file>
 
+<file path=ppt/slides/slide13.xml><?xml version="1.0" encoding="utf-8"?>
+<p:sld xmlns:a="http://schemas.openxmlformats.org/drawingml/2006/main" xmlns:r="http://schemas.openxmlformats.org/officeDocument/2006/relationships" xmlns:p="http://schemas.openxmlformats.org/presentationml/2006/main">
+  <p:cSld>
+    <p:spTree>
+      <p:nvGrpSpPr>
+        <p:cNvPr id="1" name=""/>
+        <p:cNvGrpSpPr/>
+        <p:nvPr/>
+      </p:nvGrpSpPr>
+      <p:grpSpPr>
+        <a:xfrm>
+          <a:off x="0" y="0"/>
+          <a:ext cx="0" cy="0"/>
+          <a:chOff x="0" y="0"/>
+          <a:chExt cx="0" cy="0"/>
+        </a:xfrm>
+      </p:grpSpPr>
+      <p:pic>
+        <p:nvPicPr>
+          <p:cNvPr id="1026" name="Picture 2" descr="C:\Users\Behzad\Projects\SDP\Git-Hub\Movement\Server\visualizations\Figures\Figs\Slide6.JPG"/>
+          <p:cNvPicPr>
+            <a:picLocks noChangeAspect="1" noChangeArrowheads="1"/>
+          </p:cNvPicPr>
+          <p:nvPr/>
+        </p:nvPicPr>
+        <p:blipFill>
+          <a:blip r:embed="rId3" cstate="print">
+            <a:extLst>
+              <a:ext uri="{28A0092B-C50C-407E-A947-70E740481C1C}">
+                <a14:useLocalDpi xmlns:a14="http://schemas.microsoft.com/office/drawing/2010/main" val="0"/>
+              </a:ext>
+            </a:extLst>
+          </a:blip>
+          <a:srcRect/>
+          <a:stretch>
+            <a:fillRect/>
+          </a:stretch>
+        </p:blipFill>
+        <p:spPr bwMode="auto">
+          <a:xfrm>
+            <a:off x="-2779184" y="304801"/>
+            <a:ext cx="1788584" cy="1341438"/>
+          </a:xfrm>
+          <a:prstGeom prst="rect">
+            <a:avLst/>
+          </a:prstGeom>
+          <a:noFill/>
+          <a:extLst>
+            <a:ext uri="{909E8E84-426E-40DD-AFC4-6F175D3DCCD1}">
+              <a14:hiddenFill xmlns:a14="http://schemas.microsoft.com/office/drawing/2010/main">
+                <a:solidFill>
+                  <a:srgbClr val="FFFFFF"/>
+                </a:solidFill>
+              </a14:hiddenFill>
+            </a:ext>
+          </a:extLst>
+        </p:spPr>
+      </p:pic>
+      <p:pic>
+        <p:nvPicPr>
+          <p:cNvPr id="1027" name="Picture 3" descr="C:\Users\Behzad\Projects\SDP\Git-Hub\Movement\Server\visualizations\Figures\Figs\Slide7.JPG"/>
+          <p:cNvPicPr>
+            <a:picLocks noChangeAspect="1" noChangeArrowheads="1"/>
+          </p:cNvPicPr>
+          <p:nvPr/>
+        </p:nvPicPr>
+        <p:blipFill>
+          <a:blip r:embed="rId4" cstate="print">
+            <a:extLst>
+              <a:ext uri="{28A0092B-C50C-407E-A947-70E740481C1C}">
+                <a14:useLocalDpi xmlns:a14="http://schemas.microsoft.com/office/drawing/2010/main" val="0"/>
+              </a:ext>
+            </a:extLst>
+          </a:blip>
+          <a:srcRect/>
+          <a:stretch>
+            <a:fillRect/>
+          </a:stretch>
+        </p:blipFill>
+        <p:spPr bwMode="auto">
+          <a:xfrm>
+            <a:off x="-990600" y="304800"/>
+            <a:ext cx="1788584" cy="1341438"/>
+          </a:xfrm>
+          <a:prstGeom prst="rect">
+            <a:avLst/>
+          </a:prstGeom>
+          <a:noFill/>
+          <a:extLst>
+            <a:ext uri="{909E8E84-426E-40DD-AFC4-6F175D3DCCD1}">
+              <a14:hiddenFill xmlns:a14="http://schemas.microsoft.com/office/drawing/2010/main">
+                <a:solidFill>
+                  <a:srgbClr val="FFFFFF"/>
+                </a:solidFill>
+              </a14:hiddenFill>
+            </a:ext>
+          </a:extLst>
+        </p:spPr>
+      </p:pic>
+      <p:pic>
+        <p:nvPicPr>
+          <p:cNvPr id="1028" name="Picture 4" descr="C:\Users\Behzad\Projects\SDP\Git-Hub\Movement\Server\visualizations\Figures\Figs\Slide8.JPG"/>
+          <p:cNvPicPr>
+            <a:picLocks noChangeAspect="1" noChangeArrowheads="1"/>
+          </p:cNvPicPr>
+          <p:nvPr/>
+        </p:nvPicPr>
+        <p:blipFill>
+          <a:blip r:embed="rId5" cstate="print">
+            <a:extLst>
+              <a:ext uri="{28A0092B-C50C-407E-A947-70E740481C1C}">
+                <a14:useLocalDpi xmlns:a14="http://schemas.microsoft.com/office/drawing/2010/main" val="0"/>
+              </a:ext>
+            </a:extLst>
+          </a:blip>
+          <a:srcRect/>
+          <a:stretch>
+            <a:fillRect/>
+          </a:stretch>
+        </p:blipFill>
+        <p:spPr bwMode="auto">
+          <a:xfrm>
+            <a:off x="797984" y="304801"/>
+            <a:ext cx="1788584" cy="1341438"/>
+          </a:xfrm>
+          <a:prstGeom prst="rect">
+            <a:avLst/>
+          </a:prstGeom>
+          <a:noFill/>
+          <a:extLst>
+            <a:ext uri="{909E8E84-426E-40DD-AFC4-6F175D3DCCD1}">
+              <a14:hiddenFill xmlns:a14="http://schemas.microsoft.com/office/drawing/2010/main">
+                <a:solidFill>
+                  <a:srgbClr val="FFFFFF"/>
+                </a:solidFill>
+              </a14:hiddenFill>
+            </a:ext>
+          </a:extLst>
+        </p:spPr>
+      </p:pic>
+      <p:pic>
+        <p:nvPicPr>
+          <p:cNvPr id="1029" name="Picture 5" descr="C:\Users\Behzad\Projects\SDP\Git-Hub\Movement\Server\visualizations\Figures\Figs\Slide9.JPG"/>
+          <p:cNvPicPr>
+            <a:picLocks noChangeAspect="1" noChangeArrowheads="1"/>
+          </p:cNvPicPr>
+          <p:nvPr/>
+        </p:nvPicPr>
+        <p:blipFill>
+          <a:blip r:embed="rId6" cstate="print">
+            <a:extLst>
+              <a:ext uri="{28A0092B-C50C-407E-A947-70E740481C1C}">
+                <a14:useLocalDpi xmlns:a14="http://schemas.microsoft.com/office/drawing/2010/main" val="0"/>
+              </a:ext>
+            </a:extLst>
+          </a:blip>
+          <a:srcRect/>
+          <a:stretch>
+            <a:fillRect/>
+          </a:stretch>
+        </p:blipFill>
+        <p:spPr bwMode="auto">
+          <a:xfrm>
+            <a:off x="2631016" y="304801"/>
+            <a:ext cx="1788584" cy="1341438"/>
+          </a:xfrm>
+          <a:prstGeom prst="rect">
+            <a:avLst/>
+          </a:prstGeom>
+          <a:noFill/>
+          <a:extLst>
+            <a:ext uri="{909E8E84-426E-40DD-AFC4-6F175D3DCCD1}">
+              <a14:hiddenFill xmlns:a14="http://schemas.microsoft.com/office/drawing/2010/main">
+                <a:solidFill>
+                  <a:srgbClr val="FFFFFF"/>
+                </a:solidFill>
+              </a14:hiddenFill>
+            </a:ext>
+          </a:extLst>
+        </p:spPr>
+      </p:pic>
+      <p:pic>
+        <p:nvPicPr>
+          <p:cNvPr id="1030" name="Picture 6" descr="C:\Users\Behzad\Projects\SDP\Git-Hub\Movement\Server\visualizations\Figures\Figs\Slide10.JPG"/>
+          <p:cNvPicPr>
+            <a:picLocks noChangeAspect="1" noChangeArrowheads="1"/>
+          </p:cNvPicPr>
+          <p:nvPr/>
+        </p:nvPicPr>
+        <p:blipFill>
+          <a:blip r:embed="rId7" cstate="print">
+            <a:extLst>
+              <a:ext uri="{28A0092B-C50C-407E-A947-70E740481C1C}">
+                <a14:useLocalDpi xmlns:a14="http://schemas.microsoft.com/office/drawing/2010/main" val="0"/>
+              </a:ext>
+            </a:extLst>
+          </a:blip>
+          <a:srcRect/>
+          <a:stretch>
+            <a:fillRect/>
+          </a:stretch>
+        </p:blipFill>
+        <p:spPr bwMode="auto">
+          <a:xfrm>
+            <a:off x="4383616" y="304800"/>
+            <a:ext cx="1788584" cy="1341438"/>
+          </a:xfrm>
+          <a:prstGeom prst="rect">
+            <a:avLst/>
+          </a:prstGeom>
+          <a:noFill/>
+          <a:extLst>
+            <a:ext uri="{909E8E84-426E-40DD-AFC4-6F175D3DCCD1}">
+              <a14:hiddenFill xmlns:a14="http://schemas.microsoft.com/office/drawing/2010/main">
+                <a:solidFill>
+                  <a:srgbClr val="FFFFFF"/>
+                </a:solidFill>
+              </a14:hiddenFill>
+            </a:ext>
+          </a:extLst>
+        </p:spPr>
+      </p:pic>
+      <p:pic>
+        <p:nvPicPr>
+          <p:cNvPr id="1031" name="Picture 7" descr="C:\Users\Behzad\Projects\SDP\Git-Hub\Movement\Server\visualizations\Figures\Figs\Slide11.JPG"/>
+          <p:cNvPicPr>
+            <a:picLocks noChangeAspect="1" noChangeArrowheads="1"/>
+          </p:cNvPicPr>
+          <p:nvPr/>
+        </p:nvPicPr>
+        <p:blipFill>
+          <a:blip r:embed="rId8" cstate="print">
+            <a:extLst>
+              <a:ext uri="{28A0092B-C50C-407E-A947-70E740481C1C}">
+                <a14:useLocalDpi xmlns:a14="http://schemas.microsoft.com/office/drawing/2010/main" val="0"/>
+              </a:ext>
+            </a:extLst>
+          </a:blip>
+          <a:srcRect/>
+          <a:stretch>
+            <a:fillRect/>
+          </a:stretch>
+        </p:blipFill>
+        <p:spPr bwMode="auto">
+          <a:xfrm>
+            <a:off x="6172200" y="304801"/>
+            <a:ext cx="1788583" cy="1341437"/>
+          </a:xfrm>
+          <a:prstGeom prst="rect">
+            <a:avLst/>
+          </a:prstGeom>
+          <a:noFill/>
+          <a:extLst>
+            <a:ext uri="{909E8E84-426E-40DD-AFC4-6F175D3DCCD1}">
+              <a14:hiddenFill xmlns:a14="http://schemas.microsoft.com/office/drawing/2010/main">
+                <a:solidFill>
+                  <a:srgbClr val="FFFFFF"/>
+                </a:solidFill>
+              </a14:hiddenFill>
+            </a:ext>
+          </a:extLst>
+        </p:spPr>
+      </p:pic>
+      <p:pic>
+        <p:nvPicPr>
+          <p:cNvPr id="1032" name="Picture 8" descr="C:\Users\Behzad\Projects\SDP\Git-Hub\Movement\Server\visualizations\Figures\Figs\Slide12.JPG"/>
+          <p:cNvPicPr>
+            <a:picLocks noChangeAspect="1" noChangeArrowheads="1"/>
+          </p:cNvPicPr>
+          <p:nvPr/>
+        </p:nvPicPr>
+        <p:blipFill>
+          <a:blip r:embed="rId9" cstate="print">
+            <a:extLst>
+              <a:ext uri="{28A0092B-C50C-407E-A947-70E740481C1C}">
+                <a14:useLocalDpi xmlns:a14="http://schemas.microsoft.com/office/drawing/2010/main" val="0"/>
+              </a:ext>
+            </a:extLst>
+          </a:blip>
+          <a:srcRect/>
+          <a:stretch>
+            <a:fillRect/>
+          </a:stretch>
+        </p:blipFill>
+        <p:spPr bwMode="auto">
+          <a:xfrm>
+            <a:off x="7951370" y="304801"/>
+            <a:ext cx="1788582" cy="1341437"/>
+          </a:xfrm>
+          <a:prstGeom prst="rect">
+            <a:avLst/>
+          </a:prstGeom>
+          <a:noFill/>
+          <a:extLst>
+            <a:ext uri="{909E8E84-426E-40DD-AFC4-6F175D3DCCD1}">
+              <a14:hiddenFill xmlns:a14="http://schemas.microsoft.com/office/drawing/2010/main">
+                <a:solidFill>
+                  <a:srgbClr val="FFFFFF"/>
+                </a:solidFill>
+              </a14:hiddenFill>
+            </a:ext>
+          </a:extLst>
+        </p:spPr>
+      </p:pic>
+    </p:spTree>
+    <p:extLst>
+      <p:ext uri="{BB962C8B-B14F-4D97-AF65-F5344CB8AC3E}">
+        <p14:creationId xmlns:p14="http://schemas.microsoft.com/office/powerpoint/2010/main" val="2425259597"/>
+      </p:ext>
+    </p:extLst>
+  </p:cSld>
+  <p:clrMapOvr>
+    <a:masterClrMapping/>
+  </p:clrMapOvr>
+</p:sld>
+</file>
+
 <file path=ppt/slides/slide2.xml><?xml version="1.0" encoding="utf-8"?>
 <p:sld xmlns:a="http://schemas.openxmlformats.org/drawingml/2006/main" xmlns:r="http://schemas.openxmlformats.org/officeDocument/2006/relationships" xmlns:p="http://schemas.openxmlformats.org/presentationml/2006/main">
   <p:cSld>
@@ -13679,8 +14081,8 @@
           </p:cxnSp>
         </p:grpSp>
       </p:grpSp>
-      <mc:AlternateContent xmlns:mc="http://schemas.openxmlformats.org/markup-compatibility/2006">
-        <mc:Choice xmlns:a14="http://schemas.microsoft.com/office/drawing/2010/main" Requires="a14">
+      <mc:AlternateContent xmlns:mc="http://schemas.openxmlformats.org/markup-compatibility/2006" xmlns:a14="http://schemas.microsoft.com/office/drawing/2010/main">
+        <mc:Choice Requires="a14">
           <p:sp>
             <p:nvSpPr>
               <p:cNvPr id="1040" name="TextBox 1039"/>
@@ -13703,6 +14105,7 @@
               </a:bodyPr>
               <a:lstStyle/>
               <a:p>
+                <a:pPr/>
                 <a14:m>
                   <m:oMathPara xmlns:m="http://schemas.openxmlformats.org/officeDocument/2006/math">
                     <m:oMathParaPr>
@@ -14006,6 +14409,7 @@
                 </a:endParaRPr>
               </a:p>
               <a:p>
+                <a:pPr/>
                 <a14:m>
                   <m:oMathPara xmlns:m="http://schemas.openxmlformats.org/officeDocument/2006/math">
                     <m:oMathParaPr>
@@ -14336,6 +14740,7 @@
                 </a:endParaRPr>
               </a:p>
               <a:p>
+                <a:pPr/>
                 <a14:m>
                   <m:oMathPara xmlns:m="http://schemas.openxmlformats.org/officeDocument/2006/math">
                     <m:oMathParaPr>
@@ -14638,6 +15043,7 @@
                 </a:endParaRPr>
               </a:p>
               <a:p>
+                <a:pPr/>
                 <a14:m>
                   <m:oMathPara xmlns:m="http://schemas.openxmlformats.org/officeDocument/2006/math">
                     <m:oMathParaPr>
@@ -14934,16 +15340,7 @@
                                   </a:solidFill>
                                   <a:latin typeface="Cambria Math"/>
                                 </a:rPr>
-                                <m:t>2</m:t>
-                              </m:r>
-                              <m:r>
-                                <a:rPr lang="en-US" i="1">
-                                  <a:solidFill>
-                                    <a:schemeClr val="bg1"/>
-                                  </a:solidFill>
-                                  <a:latin typeface="Cambria Math"/>
-                                </a:rPr>
-                                <m:t>0</m:t>
+                                <m:t>20</m:t>
                               </m:r>
                             </m:sub>
                           </m:sSub>
@@ -14970,7 +15367,7 @@
             </p:txBody>
           </p:sp>
         </mc:Choice>
-        <mc:Fallback>
+        <mc:Fallback xmlns="">
           <p:sp>
             <p:nvSpPr>
               <p:cNvPr id="1040" name="TextBox 1039"/>
@@ -15852,995 +16249,44 @@
           <a:chExt cx="0" cy="0"/>
         </a:xfrm>
       </p:grpSpPr>
-      <p:grpSp>
-        <p:nvGrpSpPr>
-          <p:cNvPr id="52" name="Group 51"/>
-          <p:cNvGrpSpPr>
-            <a:grpSpLocks noChangeAspect="1"/>
-          </p:cNvGrpSpPr>
-          <p:nvPr/>
-        </p:nvGrpSpPr>
-        <p:grpSpPr>
-          <a:xfrm>
-            <a:off x="847858" y="193618"/>
-            <a:ext cx="5781542" cy="5216582"/>
-            <a:chOff x="288307" y="457200"/>
-            <a:chExt cx="6544463" cy="5904955"/>
-          </a:xfrm>
-        </p:grpSpPr>
-        <p:grpSp>
-          <p:nvGrpSpPr>
-            <p:cNvPr id="39" name="Group 38"/>
-            <p:cNvGrpSpPr/>
-            <p:nvPr/>
-          </p:nvGrpSpPr>
-          <p:grpSpPr>
-            <a:xfrm>
-              <a:off x="288307" y="990600"/>
-              <a:ext cx="6544463" cy="5371555"/>
-              <a:chOff x="858564" y="-190656"/>
-              <a:chExt cx="6544463" cy="5371555"/>
-            </a:xfrm>
-          </p:grpSpPr>
-          <p:sp>
-            <p:nvSpPr>
-              <p:cNvPr id="4" name="Rounded Rectangle 3"/>
-              <p:cNvSpPr/>
-              <p:nvPr/>
-            </p:nvSpPr>
-            <p:spPr>
-              <a:xfrm rot="2483448">
-                <a:off x="3033906" y="1259374"/>
-                <a:ext cx="1676400" cy="2895600"/>
-              </a:xfrm>
-              <a:prstGeom prst="roundRect">
-                <a:avLst/>
-              </a:prstGeom>
-            </p:spPr>
-            <p:style>
-              <a:lnRef idx="2">
-                <a:schemeClr val="accent1">
-                  <a:shade val="50000"/>
-                </a:schemeClr>
-              </a:lnRef>
-              <a:fillRef idx="1">
-                <a:schemeClr val="accent1"/>
-              </a:fillRef>
-              <a:effectRef idx="0">
-                <a:schemeClr val="accent1"/>
-              </a:effectRef>
-              <a:fontRef idx="minor">
-                <a:schemeClr val="lt1"/>
-              </a:fontRef>
-            </p:style>
-            <p:txBody>
-              <a:bodyPr rtlCol="0" anchor="ctr"/>
-              <a:lstStyle/>
-              <a:p>
-                <a:pPr algn="ctr"/>
-                <a:endParaRPr lang="en-US"/>
-              </a:p>
-            </p:txBody>
-          </p:sp>
-          <p:sp>
-            <p:nvSpPr>
-              <p:cNvPr id="6" name="Rounded Rectangle 5"/>
-              <p:cNvSpPr/>
-              <p:nvPr/>
-            </p:nvSpPr>
-            <p:spPr>
-              <a:xfrm rot="2483448">
-                <a:off x="2566546" y="1953753"/>
-                <a:ext cx="277108" cy="953291"/>
-              </a:xfrm>
-              <a:prstGeom prst="roundRect">
-                <a:avLst/>
-              </a:prstGeom>
-            </p:spPr>
-            <p:style>
-              <a:lnRef idx="2">
-                <a:schemeClr val="accent1">
-                  <a:shade val="50000"/>
-                </a:schemeClr>
-              </a:lnRef>
-              <a:fillRef idx="1">
-                <a:schemeClr val="accent1"/>
-              </a:fillRef>
-              <a:effectRef idx="0">
-                <a:schemeClr val="accent1"/>
-              </a:effectRef>
-              <a:fontRef idx="minor">
-                <a:schemeClr val="lt1"/>
-              </a:fontRef>
-            </p:style>
-            <p:txBody>
-              <a:bodyPr rtlCol="0" anchor="ctr"/>
-              <a:lstStyle/>
-              <a:p>
-                <a:pPr algn="ctr"/>
-                <a:endParaRPr lang="en-US"/>
-              </a:p>
-            </p:txBody>
-          </p:sp>
-          <p:sp>
-            <p:nvSpPr>
-              <p:cNvPr id="7" name="Rounded Rectangle 6"/>
-              <p:cNvSpPr/>
-              <p:nvPr/>
-            </p:nvSpPr>
-            <p:spPr>
-              <a:xfrm rot="2483448">
-                <a:off x="4166746" y="3325353"/>
-                <a:ext cx="277108" cy="953291"/>
-              </a:xfrm>
-              <a:prstGeom prst="roundRect">
-                <a:avLst/>
-              </a:prstGeom>
-            </p:spPr>
-            <p:style>
-              <a:lnRef idx="2">
-                <a:schemeClr val="accent1">
-                  <a:shade val="50000"/>
-                </a:schemeClr>
-              </a:lnRef>
-              <a:fillRef idx="1">
-                <a:schemeClr val="accent1"/>
-              </a:fillRef>
-              <a:effectRef idx="0">
-                <a:schemeClr val="accent1"/>
-              </a:effectRef>
-              <a:fontRef idx="minor">
-                <a:schemeClr val="lt1"/>
-              </a:fontRef>
-            </p:style>
-            <p:txBody>
-              <a:bodyPr rtlCol="0" anchor="ctr"/>
-              <a:lstStyle/>
-              <a:p>
-                <a:pPr algn="ctr"/>
-                <a:endParaRPr lang="en-US"/>
-              </a:p>
-            </p:txBody>
-          </p:sp>
-          <p:cxnSp>
-            <p:nvCxnSpPr>
-              <p:cNvPr id="11" name="Straight Arrow Connector 10"/>
-              <p:cNvCxnSpPr/>
-              <p:nvPr/>
-            </p:nvCxnSpPr>
-            <p:spPr>
-              <a:xfrm flipV="1">
-                <a:off x="1365164" y="228601"/>
-                <a:ext cx="0" cy="4952298"/>
-              </a:xfrm>
-              <a:prstGeom prst="straightConnector1">
-                <a:avLst/>
-              </a:prstGeom>
-              <a:ln w="28575">
-                <a:solidFill>
-                  <a:schemeClr val="bg2"/>
-                </a:solidFill>
-                <a:tailEnd type="arrow"/>
-              </a:ln>
-            </p:spPr>
-            <p:style>
-              <a:lnRef idx="1">
-                <a:schemeClr val="accent1"/>
-              </a:lnRef>
-              <a:fillRef idx="0">
-                <a:schemeClr val="accent1"/>
-              </a:fillRef>
-              <a:effectRef idx="0">
-                <a:schemeClr val="accent1"/>
-              </a:effectRef>
-              <a:fontRef idx="minor">
-                <a:schemeClr val="tx1"/>
-              </a:fontRef>
-            </p:style>
-          </p:cxnSp>
-          <p:cxnSp>
-            <p:nvCxnSpPr>
-              <p:cNvPr id="12" name="Straight Arrow Connector 11"/>
-              <p:cNvCxnSpPr/>
-              <p:nvPr/>
-            </p:nvCxnSpPr>
-            <p:spPr>
-              <a:xfrm>
-                <a:off x="1106399" y="4749619"/>
-                <a:ext cx="6296628" cy="1"/>
-              </a:xfrm>
-              <a:prstGeom prst="straightConnector1">
-                <a:avLst/>
-              </a:prstGeom>
-              <a:ln w="28575">
-                <a:solidFill>
-                  <a:schemeClr val="bg2"/>
-                </a:solidFill>
-                <a:tailEnd type="arrow"/>
-              </a:ln>
-            </p:spPr>
-            <p:style>
-              <a:lnRef idx="1">
-                <a:schemeClr val="accent1"/>
-              </a:lnRef>
-              <a:fillRef idx="0">
-                <a:schemeClr val="accent1"/>
-              </a:fillRef>
-              <a:effectRef idx="0">
-                <a:schemeClr val="accent1"/>
-              </a:effectRef>
-              <a:fontRef idx="minor">
-                <a:schemeClr val="tx1"/>
-              </a:fontRef>
-            </p:style>
-          </p:cxnSp>
-          <p:cxnSp>
-            <p:nvCxnSpPr>
-              <p:cNvPr id="17" name="Straight Connector 16"/>
-              <p:cNvCxnSpPr/>
-              <p:nvPr/>
-            </p:nvCxnSpPr>
-            <p:spPr>
-              <a:xfrm flipV="1">
-                <a:off x="3834009" y="201246"/>
-                <a:ext cx="2" cy="4548375"/>
-              </a:xfrm>
-              <a:prstGeom prst="line">
-                <a:avLst/>
-              </a:prstGeom>
-              <a:ln w="25400">
-                <a:solidFill>
-                  <a:srgbClr val="FFC000"/>
-                </a:solidFill>
-                <a:prstDash val="dash"/>
-              </a:ln>
-            </p:spPr>
-            <p:style>
-              <a:lnRef idx="1">
-                <a:schemeClr val="accent1"/>
-              </a:lnRef>
-              <a:fillRef idx="0">
-                <a:schemeClr val="accent1"/>
-              </a:fillRef>
-              <a:effectRef idx="0">
-                <a:schemeClr val="accent1"/>
-              </a:effectRef>
-              <a:fontRef idx="minor">
-                <a:schemeClr val="tx1"/>
-              </a:fontRef>
-            </p:style>
-          </p:cxnSp>
-          <p:cxnSp>
-            <p:nvCxnSpPr>
-              <p:cNvPr id="23" name="Straight Connector 22"/>
-              <p:cNvCxnSpPr/>
-              <p:nvPr/>
-            </p:nvCxnSpPr>
-            <p:spPr>
-              <a:xfrm flipV="1">
-                <a:off x="1365164" y="2717056"/>
-                <a:ext cx="5779098" cy="6122"/>
-              </a:xfrm>
-              <a:prstGeom prst="line">
-                <a:avLst/>
-              </a:prstGeom>
-              <a:ln w="25400">
-                <a:solidFill>
-                  <a:srgbClr val="FFC000"/>
-                </a:solidFill>
-                <a:prstDash val="dash"/>
-              </a:ln>
-            </p:spPr>
-            <p:style>
-              <a:lnRef idx="1">
-                <a:schemeClr val="accent1"/>
-              </a:lnRef>
-              <a:fillRef idx="0">
-                <a:schemeClr val="accent1"/>
-              </a:fillRef>
-              <a:effectRef idx="0">
-                <a:schemeClr val="accent1"/>
-              </a:effectRef>
-              <a:fontRef idx="minor">
-                <a:schemeClr val="tx1"/>
-              </a:fontRef>
-            </p:style>
-          </p:cxnSp>
-          <p:sp>
-            <p:nvSpPr>
-              <p:cNvPr id="27" name="TextBox 26"/>
-              <p:cNvSpPr txBox="1"/>
-              <p:nvPr/>
-            </p:nvSpPr>
-            <p:spPr>
-              <a:xfrm>
-                <a:off x="858564" y="2526268"/>
-                <a:ext cx="420344" cy="369332"/>
-              </a:xfrm>
-              <a:prstGeom prst="rect">
-                <a:avLst/>
-              </a:prstGeom>
-              <a:noFill/>
-            </p:spPr>
-            <p:txBody>
-              <a:bodyPr wrap="square" rtlCol="0">
-                <a:spAutoFit/>
-              </a:bodyPr>
-              <a:lstStyle/>
-              <a:p>
-                <a:r>
-                  <a:rPr lang="en-US" dirty="0" smtClean="0">
-                    <a:solidFill>
-                      <a:schemeClr val="bg1"/>
-                    </a:solidFill>
-                  </a:rPr>
-                  <a:t>X</a:t>
-                </a:r>
-                <a:endParaRPr lang="en-US" dirty="0">
-                  <a:solidFill>
-                    <a:schemeClr val="bg1"/>
-                  </a:solidFill>
-                </a:endParaRPr>
-              </a:p>
-            </p:txBody>
-          </p:sp>
-          <p:sp>
-            <p:nvSpPr>
-              <p:cNvPr id="28" name="TextBox 27"/>
-              <p:cNvSpPr txBox="1"/>
-              <p:nvPr/>
-            </p:nvSpPr>
-            <p:spPr>
-              <a:xfrm>
-                <a:off x="3676028" y="4811567"/>
-                <a:ext cx="420343" cy="369332"/>
-              </a:xfrm>
-              <a:prstGeom prst="rect">
-                <a:avLst/>
-              </a:prstGeom>
-              <a:noFill/>
-            </p:spPr>
-            <p:txBody>
-              <a:bodyPr wrap="square" rtlCol="0">
-                <a:spAutoFit/>
-              </a:bodyPr>
-              <a:lstStyle/>
-              <a:p>
-                <a:r>
-                  <a:rPr lang="en-US" dirty="0" smtClean="0">
-                    <a:solidFill>
-                      <a:schemeClr val="bg1"/>
-                    </a:solidFill>
-                  </a:rPr>
-                  <a:t>Y</a:t>
-                </a:r>
-              </a:p>
-            </p:txBody>
-          </p:sp>
-          <p:sp>
-            <p:nvSpPr>
-              <p:cNvPr id="30" name="Arc 29"/>
-              <p:cNvSpPr/>
-              <p:nvPr/>
-            </p:nvSpPr>
-            <p:spPr>
-              <a:xfrm rot="2483827">
-                <a:off x="2832198" y="1019354"/>
-                <a:ext cx="2946204" cy="2765149"/>
-              </a:xfrm>
-              <a:prstGeom prst="arc">
-                <a:avLst>
-                  <a:gd name="adj1" fmla="val 15906267"/>
-                  <a:gd name="adj2" fmla="val 19789987"/>
-                </a:avLst>
-              </a:prstGeom>
-              <a:ln w="25400">
-                <a:solidFill>
-                  <a:srgbClr val="FFC000"/>
-                </a:solidFill>
-              </a:ln>
-            </p:spPr>
-            <p:style>
-              <a:lnRef idx="1">
-                <a:schemeClr val="accent1"/>
-              </a:lnRef>
-              <a:fillRef idx="0">
-                <a:schemeClr val="accent1"/>
-              </a:fillRef>
-              <a:effectRef idx="0">
-                <a:schemeClr val="accent1"/>
-              </a:effectRef>
-              <a:fontRef idx="minor">
-                <a:schemeClr val="tx1"/>
-              </a:fontRef>
-            </p:style>
-            <p:txBody>
-              <a:bodyPr rtlCol="0" anchor="ctr"/>
-              <a:lstStyle/>
-              <a:p>
-                <a:pPr algn="ctr"/>
-                <a:endParaRPr lang="en-US"/>
-              </a:p>
-            </p:txBody>
-          </p:sp>
-          <p:sp>
-            <p:nvSpPr>
-              <p:cNvPr id="31" name="TextBox 30"/>
-              <p:cNvSpPr txBox="1"/>
-              <p:nvPr/>
-            </p:nvSpPr>
-            <p:spPr>
-              <a:xfrm>
-                <a:off x="5638800" y="1595735"/>
-                <a:ext cx="420343" cy="461665"/>
-              </a:xfrm>
-              <a:prstGeom prst="rect">
-                <a:avLst/>
-              </a:prstGeom>
-              <a:noFill/>
-            </p:spPr>
-            <p:txBody>
-              <a:bodyPr wrap="square" rtlCol="0">
-                <a:spAutoFit/>
-              </a:bodyPr>
-              <a:lstStyle/>
-              <a:p>
-                <a:r>
-                  <a:rPr lang="el-GR" sz="2400" dirty="0" smtClean="0">
-                    <a:solidFill>
-                      <a:schemeClr val="bg1"/>
-                    </a:solidFill>
-                    <a:latin typeface="Times New Roman"/>
-                    <a:cs typeface="Times New Roman"/>
-                  </a:rPr>
-                  <a:t>Θ</a:t>
-                </a:r>
-                <a:endParaRPr lang="en-US" dirty="0">
-                  <a:solidFill>
-                    <a:schemeClr val="bg1"/>
-                  </a:solidFill>
-                </a:endParaRPr>
-              </a:p>
-            </p:txBody>
-          </p:sp>
-          <p:sp>
-            <p:nvSpPr>
-              <p:cNvPr id="32" name="Arc 31"/>
-              <p:cNvSpPr>
-                <a:spLocks noChangeAspect="1"/>
-              </p:cNvSpPr>
-              <p:nvPr/>
-            </p:nvSpPr>
-            <p:spPr>
-              <a:xfrm rot="21393980">
-                <a:off x="1794366" y="-50878"/>
-                <a:ext cx="4079285" cy="4370306"/>
-              </a:xfrm>
-              <a:prstGeom prst="arc">
-                <a:avLst>
-                  <a:gd name="adj1" fmla="val 17486671"/>
-                  <a:gd name="adj2" fmla="val 19711374"/>
-                </a:avLst>
-              </a:prstGeom>
-              <a:ln w="28575">
-                <a:solidFill>
-                  <a:srgbClr val="92D050"/>
-                </a:solidFill>
-                <a:headEnd type="triangle" w="lg" len="lg"/>
-                <a:tailEnd type="triangle" w="lg" len="lg"/>
-              </a:ln>
-            </p:spPr>
-            <p:style>
-              <a:lnRef idx="1">
-                <a:schemeClr val="accent1"/>
-              </a:lnRef>
-              <a:fillRef idx="0">
-                <a:schemeClr val="accent1"/>
-              </a:fillRef>
-              <a:effectRef idx="0">
-                <a:schemeClr val="accent1"/>
-              </a:effectRef>
-              <a:fontRef idx="minor">
-                <a:schemeClr val="tx1"/>
-              </a:fontRef>
-            </p:style>
-            <p:txBody>
-              <a:bodyPr rtlCol="0" anchor="ctr"/>
-              <a:lstStyle/>
-              <a:p>
-                <a:pPr algn="ctr"/>
-                <a:endParaRPr lang="en-US"/>
-              </a:p>
-            </p:txBody>
-          </p:sp>
-          <mc:AlternateContent xmlns:mc="http://schemas.openxmlformats.org/markup-compatibility/2006">
-            <mc:Choice xmlns:a14="http://schemas.microsoft.com/office/drawing/2010/main" Requires="a14">
-              <p:sp>
-                <p:nvSpPr>
-                  <p:cNvPr id="33" name="TextBox 32"/>
-                  <p:cNvSpPr txBox="1"/>
-                  <p:nvPr/>
-                </p:nvSpPr>
-                <p:spPr>
-                  <a:xfrm>
-                    <a:off x="4334203" y="-190656"/>
-                    <a:ext cx="1676400" cy="391902"/>
-                  </a:xfrm>
-                  <a:prstGeom prst="rect">
-                    <a:avLst/>
-                  </a:prstGeom>
-                  <a:noFill/>
-                </p:spPr>
-                <p:txBody>
-                  <a:bodyPr wrap="square" rtlCol="0">
-                    <a:spAutoFit/>
-                  </a:bodyPr>
-                  <a:lstStyle/>
-                  <a:p>
-                    <a14:m>
-                      <m:oMathPara xmlns:m="http://schemas.openxmlformats.org/officeDocument/2006/math">
-                        <m:oMathParaPr>
-                          <m:jc m:val="centerGroup"/>
-                        </m:oMathParaPr>
-                        <m:oMath xmlns:m="http://schemas.openxmlformats.org/officeDocument/2006/math">
-                          <m:sSub>
-                            <m:sSubPr>
-                              <m:ctrlPr>
-                                <a:rPr lang="en-US" b="0" i="1" smtClean="0">
-                                  <a:solidFill>
-                                    <a:schemeClr val="bg1"/>
-                                  </a:solidFill>
-                                  <a:latin typeface="Cambria Math"/>
-                                </a:rPr>
-                              </m:ctrlPr>
-                            </m:sSubPr>
-                            <m:e>
-                              <m:r>
-                                <a:rPr lang="en-US" b="0" i="1" smtClean="0">
-                                  <a:solidFill>
-                                    <a:schemeClr val="bg1"/>
-                                  </a:solidFill>
-                                  <a:latin typeface="Cambria Math"/>
-                                </a:rPr>
-                                <m:t>𝑉</m:t>
-                              </m:r>
-                            </m:e>
-                            <m:sub>
-                              <m:r>
-                                <a:rPr lang="en-US" b="0" i="1" smtClean="0">
-                                  <a:solidFill>
-                                    <a:schemeClr val="bg1"/>
-                                  </a:solidFill>
-                                  <a:latin typeface="Cambria Math"/>
-                                </a:rPr>
-                                <m:t>𝐴𝑛𝑔𝑢𝑙𝑎𝑟</m:t>
-                              </m:r>
-                            </m:sub>
-                          </m:sSub>
-                        </m:oMath>
-                      </m:oMathPara>
-                    </a14:m>
-                    <a:endParaRPr lang="en-US" dirty="0">
-                      <a:solidFill>
-                        <a:schemeClr val="bg1"/>
-                      </a:solidFill>
-                    </a:endParaRPr>
-                  </a:p>
-                </p:txBody>
-              </p:sp>
-            </mc:Choice>
-            <mc:Fallback>
-              <p:sp>
-                <p:nvSpPr>
-                  <p:cNvPr id="33" name="TextBox 32"/>
-                  <p:cNvSpPr txBox="1">
-                    <a:spLocks noRot="1" noChangeAspect="1" noMove="1" noResize="1" noEditPoints="1" noAdjustHandles="1" noChangeArrowheads="1" noChangeShapeType="1" noTextEdit="1"/>
-                  </p:cNvSpPr>
-                  <p:nvPr/>
-                </p:nvSpPr>
-                <p:spPr>
-                  <a:xfrm>
-                    <a:off x="4334203" y="-190656"/>
-                    <a:ext cx="1676400" cy="391902"/>
-                  </a:xfrm>
-                  <a:prstGeom prst="rect">
-                    <a:avLst/>
-                  </a:prstGeom>
-                  <a:blipFill rotWithShape="1">
-                    <a:blip r:embed="rId3"/>
-                    <a:stretch>
-                      <a:fillRect b="-22807"/>
-                    </a:stretch>
-                  </a:blipFill>
-                </p:spPr>
-                <p:txBody>
-                  <a:bodyPr/>
-                  <a:lstStyle/>
-                  <a:p>
-                    <a:r>
-                      <a:rPr lang="en-US">
-                        <a:noFill/>
-                      </a:rPr>
-                      <a:t> </a:t>
-                    </a:r>
-                  </a:p>
-                </p:txBody>
-              </p:sp>
-            </mc:Fallback>
-          </mc:AlternateContent>
-          <p:cxnSp>
-            <p:nvCxnSpPr>
-              <p:cNvPr id="35" name="Straight Connector 34"/>
-              <p:cNvCxnSpPr/>
-              <p:nvPr/>
-            </p:nvCxnSpPr>
-            <p:spPr>
-              <a:xfrm flipH="1">
-                <a:off x="3834011" y="385825"/>
-                <a:ext cx="2225132" cy="2337353"/>
-              </a:xfrm>
-              <a:prstGeom prst="line">
-                <a:avLst/>
-              </a:prstGeom>
-              <a:ln w="25400">
-                <a:solidFill>
-                  <a:srgbClr val="92D050"/>
-                </a:solidFill>
-                <a:headEnd type="triangle" w="lg" len="lg"/>
-                <a:tailEnd type="none" w="lg" len="lg"/>
-              </a:ln>
-            </p:spPr>
-            <p:style>
-              <a:lnRef idx="1">
-                <a:schemeClr val="accent1"/>
-              </a:lnRef>
-              <a:fillRef idx="0">
-                <a:schemeClr val="accent1"/>
-              </a:fillRef>
-              <a:effectRef idx="0">
-                <a:schemeClr val="accent1"/>
-              </a:effectRef>
-              <a:fontRef idx="minor">
-                <a:schemeClr val="tx1"/>
-              </a:fontRef>
-            </p:style>
-          </p:cxnSp>
-          <mc:AlternateContent xmlns:mc="http://schemas.openxmlformats.org/markup-compatibility/2006">
-            <mc:Choice xmlns:a14="http://schemas.microsoft.com/office/drawing/2010/main" Requires="a14">
-              <p:sp>
-                <p:nvSpPr>
-                  <p:cNvPr id="38" name="TextBox 37"/>
-                  <p:cNvSpPr txBox="1"/>
-                  <p:nvPr/>
-                </p:nvSpPr>
-                <p:spPr>
-                  <a:xfrm rot="18714884">
-                    <a:off x="4876605" y="808773"/>
-                    <a:ext cx="1676400" cy="369332"/>
-                  </a:xfrm>
-                  <a:prstGeom prst="rect">
-                    <a:avLst/>
-                  </a:prstGeom>
-                  <a:noFill/>
-                </p:spPr>
-                <p:txBody>
-                  <a:bodyPr wrap="square" rtlCol="0">
-                    <a:spAutoFit/>
-                  </a:bodyPr>
-                  <a:lstStyle/>
-                  <a:p>
-                    <a14:m>
-                      <m:oMathPara xmlns:m="http://schemas.openxmlformats.org/officeDocument/2006/math">
-                        <m:oMathParaPr>
-                          <m:jc m:val="centerGroup"/>
-                        </m:oMathParaPr>
-                        <m:oMath xmlns:m="http://schemas.openxmlformats.org/officeDocument/2006/math">
-                          <m:sSub>
-                            <m:sSubPr>
-                              <m:ctrlPr>
-                                <a:rPr lang="en-US" b="0" i="1" smtClean="0">
-                                  <a:solidFill>
-                                    <a:schemeClr val="bg1"/>
-                                  </a:solidFill>
-                                  <a:latin typeface="Cambria Math"/>
-                                </a:rPr>
-                              </m:ctrlPr>
-                            </m:sSubPr>
-                            <m:e>
-                              <m:r>
-                                <a:rPr lang="en-US" b="0" i="1" smtClean="0">
-                                  <a:solidFill>
-                                    <a:schemeClr val="bg1"/>
-                                  </a:solidFill>
-                                  <a:latin typeface="Cambria Math"/>
-                                </a:rPr>
-                                <m:t>𝑉</m:t>
-                              </m:r>
-                            </m:e>
-                            <m:sub>
-                              <m:r>
-                                <a:rPr lang="en-US" b="0" i="1" smtClean="0">
-                                  <a:solidFill>
-                                    <a:schemeClr val="bg1"/>
-                                  </a:solidFill>
-                                  <a:latin typeface="Cambria Math"/>
-                                </a:rPr>
-                                <m:t>𝐿𝑖𝑛𝑒𝑎𝑟</m:t>
-                              </m:r>
-                            </m:sub>
-                          </m:sSub>
-                        </m:oMath>
-                      </m:oMathPara>
-                    </a14:m>
-                    <a:endParaRPr lang="en-US" dirty="0">
-                      <a:solidFill>
-                        <a:schemeClr val="bg1"/>
-                      </a:solidFill>
-                    </a:endParaRPr>
-                  </a:p>
-                </p:txBody>
-              </p:sp>
-            </mc:Choice>
-            <mc:Fallback>
-              <p:sp>
-                <p:nvSpPr>
-                  <p:cNvPr id="38" name="TextBox 37"/>
-                  <p:cNvSpPr txBox="1">
-                    <a:spLocks noRot="1" noChangeAspect="1" noMove="1" noResize="1" noEditPoints="1" noAdjustHandles="1" noChangeArrowheads="1" noChangeShapeType="1" noTextEdit="1"/>
-                  </p:cNvSpPr>
-                  <p:nvPr/>
-                </p:nvSpPr>
-                <p:spPr>
-                  <a:xfrm rot="18714884">
-                    <a:off x="4876605" y="808773"/>
-                    <a:ext cx="1676400" cy="369332"/>
-                  </a:xfrm>
-                  <a:prstGeom prst="rect">
-                    <a:avLst/>
-                  </a:prstGeom>
-                  <a:blipFill rotWithShape="1">
-                    <a:blip r:embed="rId4"/>
-                    <a:stretch>
-                      <a:fillRect/>
-                    </a:stretch>
-                  </a:blipFill>
-                </p:spPr>
-                <p:txBody>
-                  <a:bodyPr/>
-                  <a:lstStyle/>
-                  <a:p>
-                    <a:r>
-                      <a:rPr lang="en-US">
-                        <a:noFill/>
-                      </a:rPr>
-                      <a:t> </a:t>
-                    </a:r>
-                  </a:p>
-                </p:txBody>
-              </p:sp>
-            </mc:Fallback>
-          </mc:AlternateContent>
-        </p:grpSp>
-        <p:cxnSp>
-          <p:nvCxnSpPr>
-            <p:cNvPr id="40" name="Straight Connector 39"/>
-            <p:cNvCxnSpPr/>
-            <p:nvPr/>
-          </p:nvCxnSpPr>
-          <p:spPr>
-            <a:xfrm flipV="1">
-              <a:off x="3263753" y="457200"/>
-              <a:ext cx="890390" cy="3434990"/>
-            </a:xfrm>
-            <a:prstGeom prst="line">
-              <a:avLst/>
-            </a:prstGeom>
-            <a:ln w="25400">
-              <a:solidFill>
-                <a:schemeClr val="tx1">
-                  <a:lumMod val="85000"/>
-                  <a:lumOff val="15000"/>
-                </a:schemeClr>
-              </a:solidFill>
-              <a:headEnd type="none" w="lg" len="lg"/>
-              <a:tailEnd type="triangle" w="lg" len="lg"/>
-            </a:ln>
-          </p:spPr>
-          <p:style>
-            <a:lnRef idx="1">
-              <a:schemeClr val="accent1"/>
-            </a:lnRef>
-            <a:fillRef idx="0">
-              <a:schemeClr val="accent1"/>
-            </a:fillRef>
-            <a:effectRef idx="0">
-              <a:schemeClr val="accent1"/>
-            </a:effectRef>
-            <a:fontRef idx="minor">
-              <a:schemeClr val="tx1"/>
-            </a:fontRef>
-          </p:style>
-        </p:cxnSp>
-        <mc:AlternateContent xmlns:mc="http://schemas.openxmlformats.org/markup-compatibility/2006">
-          <mc:Choice xmlns:a14="http://schemas.microsoft.com/office/drawing/2010/main" Requires="a14">
-            <p:sp>
-              <p:nvSpPr>
-                <p:cNvPr id="44" name="TextBox 43"/>
-                <p:cNvSpPr txBox="1"/>
-                <p:nvPr/>
-              </p:nvSpPr>
-              <p:spPr>
-                <a:xfrm rot="17074639">
-                  <a:off x="2739902" y="1382415"/>
-                  <a:ext cx="1676400" cy="369332"/>
-                </a:xfrm>
-                <a:prstGeom prst="rect">
-                  <a:avLst/>
-                </a:prstGeom>
-                <a:noFill/>
-              </p:spPr>
-              <p:txBody>
-                <a:bodyPr wrap="square" rtlCol="0">
-                  <a:spAutoFit/>
-                </a:bodyPr>
-                <a:lstStyle/>
-                <a:p>
-                  <a14:m>
-                    <m:oMathPara xmlns:m="http://schemas.openxmlformats.org/officeDocument/2006/math">
-                      <m:oMathParaPr>
-                        <m:jc m:val="centerGroup"/>
-                      </m:oMathParaPr>
-                      <m:oMath xmlns:m="http://schemas.openxmlformats.org/officeDocument/2006/math">
-                        <m:r>
-                          <a:rPr lang="en-US" b="0" i="1" smtClean="0">
-                            <a:solidFill>
-                              <a:schemeClr val="bg1"/>
-                            </a:solidFill>
-                            <a:latin typeface="Cambria Math"/>
-                          </a:rPr>
-                          <m:t>𝑉</m:t>
-                        </m:r>
-                      </m:oMath>
-                    </m:oMathPara>
-                  </a14:m>
-                  <a:endParaRPr lang="en-US" dirty="0">
-                    <a:solidFill>
-                      <a:schemeClr val="bg1"/>
-                    </a:solidFill>
-                  </a:endParaRPr>
-                </a:p>
-              </p:txBody>
-            </p:sp>
-          </mc:Choice>
-          <mc:Fallback>
-            <p:sp>
-              <p:nvSpPr>
-                <p:cNvPr id="44" name="TextBox 43"/>
-                <p:cNvSpPr txBox="1">
-                  <a:spLocks noRot="1" noChangeAspect="1" noMove="1" noResize="1" noEditPoints="1" noAdjustHandles="1" noChangeArrowheads="1" noChangeShapeType="1" noTextEdit="1"/>
-                </p:cNvSpPr>
-                <p:nvPr/>
-              </p:nvSpPr>
-              <p:spPr>
-                <a:xfrm rot="17074639">
-                  <a:off x="2739902" y="1382415"/>
-                  <a:ext cx="1676400" cy="369332"/>
-                </a:xfrm>
-                <a:prstGeom prst="rect">
-                  <a:avLst/>
-                </a:prstGeom>
-                <a:blipFill rotWithShape="1">
-                  <a:blip r:embed="rId5"/>
-                  <a:stretch>
-                    <a:fillRect/>
-                  </a:stretch>
-                </a:blipFill>
-              </p:spPr>
-              <p:txBody>
-                <a:bodyPr/>
-                <a:lstStyle/>
-                <a:p>
-                  <a:r>
-                    <a:rPr lang="en-US">
-                      <a:noFill/>
-                    </a:rPr>
-                    <a:t> </a:t>
-                  </a:r>
-                </a:p>
-              </p:txBody>
-            </p:sp>
-          </mc:Fallback>
-        </mc:AlternateContent>
-      </p:grpSp>
       <p:sp>
         <p:nvSpPr>
-          <p:cNvPr id="53" name="Arc 52"/>
-          <p:cNvSpPr>
-            <a:spLocks/>
-          </p:cNvSpPr>
+          <p:cNvPr id="3" name="Rectangle 2"/>
+          <p:cNvSpPr/>
           <p:nvPr/>
         </p:nvSpPr>
         <p:spPr>
-          <a:xfrm rot="2453611">
-            <a:off x="4017833" y="3909882"/>
-            <a:ext cx="189392" cy="938343"/>
+          <a:xfrm>
+            <a:off x="304800" y="939622"/>
+            <a:ext cx="6019800" cy="5613578"/>
           </a:xfrm>
-          <a:prstGeom prst="arc">
-            <a:avLst>
-              <a:gd name="adj1" fmla="val 625245"/>
-              <a:gd name="adj2" fmla="val 20154452"/>
-            </a:avLst>
+          <a:prstGeom prst="rect">
+            <a:avLst/>
           </a:prstGeom>
-          <a:ln w="28575">
-            <a:solidFill>
-              <a:srgbClr val="92D050"/>
-            </a:solidFill>
-            <a:headEnd type="none" w="lg" len="lg"/>
-            <a:tailEnd type="triangle" w="lg" len="lg"/>
+          <a:solidFill>
+            <a:schemeClr val="tx1">
+              <a:lumMod val="50000"/>
+              <a:lumOff val="50000"/>
+            </a:schemeClr>
+          </a:solidFill>
+          <a:ln>
+            <a:noFill/>
           </a:ln>
         </p:spPr>
         <p:style>
-          <a:lnRef idx="1">
-            <a:schemeClr val="accent1"/>
+          <a:lnRef idx="2">
+            <a:schemeClr val="accent1">
+              <a:shade val="50000"/>
+            </a:schemeClr>
           </a:lnRef>
-          <a:fillRef idx="0">
+          <a:fillRef idx="1">
             <a:schemeClr val="accent1"/>
           </a:fillRef>
           <a:effectRef idx="0">
             <a:schemeClr val="accent1"/>
           </a:effectRef>
           <a:fontRef idx="minor">
-            <a:schemeClr val="tx1"/>
-          </a:fontRef>
-        </p:style>
-        <p:txBody>
-          <a:bodyPr rtlCol="0" anchor="ctr"/>
-          <a:lstStyle/>
-          <a:p>
-            <a:pPr algn="ctr"/>
-            <a:endParaRPr lang="en-US"/>
-          </a:p>
-        </p:txBody>
-      </p:sp>
-      <p:sp>
-        <p:nvSpPr>
-          <p:cNvPr id="54" name="Arc 53"/>
-          <p:cNvSpPr>
-            <a:spLocks/>
-          </p:cNvSpPr>
-          <p:nvPr/>
-        </p:nvSpPr>
-        <p:spPr>
-          <a:xfrm rot="2453611">
-            <a:off x="2189032" y="2318384"/>
-            <a:ext cx="189392" cy="938343"/>
-          </a:xfrm>
-          <a:prstGeom prst="arc">
-            <a:avLst>
-              <a:gd name="adj1" fmla="val 625245"/>
-              <a:gd name="adj2" fmla="val 20154452"/>
-            </a:avLst>
-          </a:prstGeom>
-          <a:ln w="28575">
-            <a:solidFill>
-              <a:srgbClr val="92D050"/>
-            </a:solidFill>
-            <a:headEnd type="none" w="lg" len="lg"/>
-            <a:tailEnd type="triangle" w="lg" len="lg"/>
-          </a:ln>
-        </p:spPr>
-        <p:style>
-          <a:lnRef idx="1">
-            <a:schemeClr val="accent1"/>
-          </a:lnRef>
-          <a:fillRef idx="0">
-            <a:schemeClr val="accent1"/>
-          </a:fillRef>
-          <a:effectRef idx="0">
-            <a:schemeClr val="accent1"/>
-          </a:effectRef>
-          <a:fontRef idx="minor">
-            <a:schemeClr val="tx1"/>
+            <a:schemeClr val="lt1"/>
           </a:fontRef>
         </p:style>
         <p:txBody>
@@ -16856,243 +16302,13 @@
         <mc:Choice xmlns:a14="http://schemas.microsoft.com/office/drawing/2010/main" Requires="a14">
           <p:sp>
             <p:nvSpPr>
-              <p:cNvPr id="55" name="TextBox 54"/>
-              <p:cNvSpPr txBox="1"/>
-              <p:nvPr/>
-            </p:nvSpPr>
-            <p:spPr>
-              <a:xfrm>
-                <a:off x="3700692" y="4494218"/>
-                <a:ext cx="1480974" cy="391902"/>
-              </a:xfrm>
-              <a:prstGeom prst="rect">
-                <a:avLst/>
-              </a:prstGeom>
-              <a:noFill/>
-            </p:spPr>
-            <p:txBody>
-              <a:bodyPr wrap="square" rtlCol="0">
-                <a:spAutoFit/>
-              </a:bodyPr>
-              <a:lstStyle/>
-              <a:p>
-                <a14:m>
-                  <m:oMathPara xmlns:m="http://schemas.openxmlformats.org/officeDocument/2006/math">
-                    <m:oMathParaPr>
-                      <m:jc m:val="centerGroup"/>
-                    </m:oMathParaPr>
-                    <m:oMath xmlns:m="http://schemas.openxmlformats.org/officeDocument/2006/math">
-                      <m:sSub>
-                        <m:sSubPr>
-                          <m:ctrlPr>
-                            <a:rPr lang="en-US" b="0" i="1" smtClean="0">
-                              <a:solidFill>
-                                <a:schemeClr val="bg1"/>
-                              </a:solidFill>
-                              <a:latin typeface="Cambria Math"/>
-                            </a:rPr>
-                          </m:ctrlPr>
-                        </m:sSubPr>
-                        <m:e>
-                          <m:r>
-                            <a:rPr lang="en-US" b="0" i="1" smtClean="0">
-                              <a:solidFill>
-                                <a:schemeClr val="bg1"/>
-                              </a:solidFill>
-                              <a:latin typeface="Cambria Math"/>
-                            </a:rPr>
-                            <m:t>𝑉</m:t>
-                          </m:r>
-                        </m:e>
-                        <m:sub>
-                          <m:r>
-                            <a:rPr lang="en-US" b="0" i="1" smtClean="0">
-                              <a:solidFill>
-                                <a:schemeClr val="bg1"/>
-                              </a:solidFill>
-                              <a:latin typeface="Cambria Math"/>
-                            </a:rPr>
-                            <m:t>𝑅𝑖𝑔h𝑡</m:t>
-                          </m:r>
-                        </m:sub>
-                      </m:sSub>
-                    </m:oMath>
-                  </m:oMathPara>
-                </a14:m>
-                <a:endParaRPr lang="en-US" dirty="0">
-                  <a:solidFill>
-                    <a:schemeClr val="bg1"/>
-                  </a:solidFill>
-                </a:endParaRPr>
-              </a:p>
-            </p:txBody>
-          </p:sp>
-        </mc:Choice>
-        <mc:Fallback>
-          <p:sp>
-            <p:nvSpPr>
-              <p:cNvPr id="55" name="TextBox 54"/>
-              <p:cNvSpPr txBox="1">
-                <a:spLocks noRot="1" noChangeAspect="1" noMove="1" noResize="1" noEditPoints="1" noAdjustHandles="1" noChangeArrowheads="1" noChangeShapeType="1" noTextEdit="1"/>
-              </p:cNvSpPr>
-              <p:nvPr/>
-            </p:nvSpPr>
-            <p:spPr>
-              <a:xfrm>
-                <a:off x="3700692" y="4494218"/>
-                <a:ext cx="1480974" cy="391902"/>
-              </a:xfrm>
-              <a:prstGeom prst="rect">
-                <a:avLst/>
-              </a:prstGeom>
-              <a:blipFill rotWithShape="1">
-                <a:blip r:embed="rId6"/>
-                <a:stretch>
-                  <a:fillRect b="-9231"/>
-                </a:stretch>
-              </a:blipFill>
-            </p:spPr>
-            <p:txBody>
-              <a:bodyPr/>
-              <a:lstStyle/>
-              <a:p>
-                <a:r>
-                  <a:rPr lang="en-US">
-                    <a:noFill/>
-                  </a:rPr>
-                  <a:t> </a:t>
-                </a:r>
-              </a:p>
-            </p:txBody>
-          </p:sp>
-        </mc:Fallback>
-      </mc:AlternateContent>
-      <mc:AlternateContent xmlns:mc="http://schemas.openxmlformats.org/markup-compatibility/2006">
-        <mc:Choice xmlns:a14="http://schemas.microsoft.com/office/drawing/2010/main" Requires="a14">
-          <p:sp>
-            <p:nvSpPr>
-              <p:cNvPr id="56" name="TextBox 55"/>
-              <p:cNvSpPr txBox="1"/>
-              <p:nvPr/>
-            </p:nvSpPr>
-            <p:spPr>
-              <a:xfrm>
-                <a:off x="1066800" y="2580218"/>
-                <a:ext cx="1480974" cy="391582"/>
-              </a:xfrm>
-              <a:prstGeom prst="rect">
-                <a:avLst/>
-              </a:prstGeom>
-              <a:noFill/>
-            </p:spPr>
-            <p:txBody>
-              <a:bodyPr wrap="square" rtlCol="0">
-                <a:spAutoFit/>
-              </a:bodyPr>
-              <a:lstStyle/>
-              <a:p>
-                <a14:m>
-                  <m:oMathPara xmlns:m="http://schemas.openxmlformats.org/officeDocument/2006/math">
-                    <m:oMathParaPr>
-                      <m:jc m:val="centerGroup"/>
-                    </m:oMathParaPr>
-                    <m:oMath xmlns:m="http://schemas.openxmlformats.org/officeDocument/2006/math">
-                      <m:sSub>
-                        <m:sSubPr>
-                          <m:ctrlPr>
-                            <a:rPr lang="en-US" b="0" i="1" smtClean="0">
-                              <a:solidFill>
-                                <a:schemeClr val="bg1"/>
-                              </a:solidFill>
-                              <a:latin typeface="Cambria Math"/>
-                            </a:rPr>
-                          </m:ctrlPr>
-                        </m:sSubPr>
-                        <m:e>
-                          <m:r>
-                            <a:rPr lang="en-US" b="0" i="1" smtClean="0">
-                              <a:solidFill>
-                                <a:schemeClr val="bg1"/>
-                              </a:solidFill>
-                              <a:latin typeface="Cambria Math"/>
-                            </a:rPr>
-                            <m:t>𝑉</m:t>
-                          </m:r>
-                        </m:e>
-                        <m:sub>
-                          <m:r>
-                            <a:rPr lang="en-US" b="0" i="1" smtClean="0">
-                              <a:solidFill>
-                                <a:schemeClr val="bg1"/>
-                              </a:solidFill>
-                              <a:latin typeface="Cambria Math"/>
-                            </a:rPr>
-                            <m:t>𝐿𝑒𝑓𝑡</m:t>
-                          </m:r>
-                        </m:sub>
-                      </m:sSub>
-                    </m:oMath>
-                  </m:oMathPara>
-                </a14:m>
-                <a:endParaRPr lang="en-US" dirty="0">
-                  <a:solidFill>
-                    <a:schemeClr val="bg1"/>
-                  </a:solidFill>
-                </a:endParaRPr>
-              </a:p>
-            </p:txBody>
-          </p:sp>
-        </mc:Choice>
-        <mc:Fallback>
-          <p:sp>
-            <p:nvSpPr>
-              <p:cNvPr id="56" name="TextBox 55"/>
-              <p:cNvSpPr txBox="1">
-                <a:spLocks noRot="1" noChangeAspect="1" noMove="1" noResize="1" noEditPoints="1" noAdjustHandles="1" noChangeArrowheads="1" noChangeShapeType="1" noTextEdit="1"/>
-              </p:cNvSpPr>
-              <p:nvPr/>
-            </p:nvSpPr>
-            <p:spPr>
-              <a:xfrm>
-                <a:off x="1066800" y="2580218"/>
-                <a:ext cx="1480974" cy="391582"/>
-              </a:xfrm>
-              <a:prstGeom prst="rect">
-                <a:avLst/>
-              </a:prstGeom>
-              <a:blipFill rotWithShape="1">
-                <a:blip r:embed="rId7"/>
-                <a:stretch>
-                  <a:fillRect b="-7692"/>
-                </a:stretch>
-              </a:blipFill>
-            </p:spPr>
-            <p:txBody>
-              <a:bodyPr/>
-              <a:lstStyle/>
-              <a:p>
-                <a:r>
-                  <a:rPr lang="en-US">
-                    <a:noFill/>
-                  </a:rPr>
-                  <a:t> </a:t>
-                </a:r>
-              </a:p>
-            </p:txBody>
-          </p:sp>
-        </mc:Fallback>
-      </mc:AlternateContent>
-      <mc:AlternateContent xmlns:mc="http://schemas.openxmlformats.org/markup-compatibility/2006">
-        <mc:Choice xmlns:a14="http://schemas.microsoft.com/office/drawing/2010/main" Requires="a14">
-          <p:sp>
-            <p:nvSpPr>
               <p:cNvPr id="65" name="TextBox 64"/>
               <p:cNvSpPr txBox="1"/>
               <p:nvPr/>
             </p:nvSpPr>
             <p:spPr>
               <a:xfrm>
-                <a:off x="5562600" y="294450"/>
+                <a:off x="6781800" y="225481"/>
                 <a:ext cx="3689087" cy="2036327"/>
               </a:xfrm>
               <a:prstGeom prst="rect">
@@ -17106,6 +16322,7 @@
               </a:bodyPr>
               <a:lstStyle/>
               <a:p>
+                <a:pPr/>
                 <a14:m>
                   <m:oMathPara xmlns:m="http://schemas.openxmlformats.org/officeDocument/2006/math">
                     <m:oMathParaPr>
@@ -17251,6 +16468,7 @@
                 </a:endParaRPr>
               </a:p>
               <a:p>
+                <a:pPr/>
                 <a14:m>
                   <m:oMathPara xmlns:m="http://schemas.openxmlformats.org/officeDocument/2006/math">
                     <m:oMathParaPr>
@@ -17761,14 +16979,14 @@
             </p:nvSpPr>
             <p:spPr>
               <a:xfrm>
-                <a:off x="5562600" y="294450"/>
+                <a:off x="6781800" y="225481"/>
                 <a:ext cx="3689087" cy="2036327"/>
               </a:xfrm>
               <a:prstGeom prst="rect">
                 <a:avLst/>
               </a:prstGeom>
               <a:blipFill rotWithShape="1">
-                <a:blip r:embed="rId8"/>
+                <a:blip r:embed="rId3"/>
                 <a:stretch>
                   <a:fillRect/>
                 </a:stretch>
@@ -17789,92 +17007,1359 @@
           </p:sp>
         </mc:Fallback>
       </mc:AlternateContent>
-      <p:sp>
-        <p:nvSpPr>
-          <p:cNvPr id="66" name="Arc 65"/>
-          <p:cNvSpPr/>
+      <p:grpSp>
+        <p:nvGrpSpPr>
+          <p:cNvPr id="2" name="Group 1"/>
+          <p:cNvGrpSpPr/>
           <p:nvPr/>
-        </p:nvSpPr>
-        <p:spPr>
-          <a:xfrm rot="2483827">
-            <a:off x="2920925" y="354608"/>
-            <a:ext cx="2602750" cy="2442800"/>
+        </p:nvGrpSpPr>
+        <p:grpSpPr>
+          <a:xfrm>
+            <a:off x="390658" y="1066800"/>
+            <a:ext cx="5781542" cy="5216582"/>
+            <a:chOff x="847858" y="193618"/>
+            <a:chExt cx="5781542" cy="5216582"/>
           </a:xfrm>
-          <a:prstGeom prst="arc">
-            <a:avLst>
-              <a:gd name="adj1" fmla="val 14491520"/>
-              <a:gd name="adj2" fmla="val 17166175"/>
-            </a:avLst>
-          </a:prstGeom>
-          <a:ln w="25400">
-            <a:solidFill>
-              <a:srgbClr val="FFC000"/>
-            </a:solidFill>
-          </a:ln>
-        </p:spPr>
-        <p:style>
-          <a:lnRef idx="1">
-            <a:schemeClr val="accent1"/>
-          </a:lnRef>
-          <a:fillRef idx="0">
-            <a:schemeClr val="accent1"/>
-          </a:fillRef>
-          <a:effectRef idx="0">
-            <a:schemeClr val="accent1"/>
-          </a:effectRef>
-          <a:fontRef idx="minor">
-            <a:schemeClr val="tx1"/>
-          </a:fontRef>
-        </p:style>
-        <p:txBody>
-          <a:bodyPr rtlCol="0" anchor="ctr"/>
-          <a:lstStyle/>
-          <a:p>
-            <a:pPr algn="ctr"/>
-            <a:endParaRPr lang="en-US"/>
-          </a:p>
-        </p:txBody>
-      </p:sp>
-      <p:sp>
-        <p:nvSpPr>
-          <p:cNvPr id="67" name="TextBox 66"/>
-          <p:cNvSpPr txBox="1"/>
-          <p:nvPr/>
-        </p:nvSpPr>
-        <p:spPr>
-          <a:xfrm>
-            <a:off x="4885167" y="212482"/>
-            <a:ext cx="371342" cy="461665"/>
-          </a:xfrm>
-          <a:prstGeom prst="rect">
-            <a:avLst/>
-          </a:prstGeom>
           <a:noFill/>
-        </p:spPr>
-        <p:txBody>
-          <a:bodyPr wrap="square" rtlCol="0">
-            <a:spAutoFit/>
-          </a:bodyPr>
-          <a:lstStyle/>
-          <a:p>
-            <a:r>
-              <a:rPr lang="el-GR" sz="2400" dirty="0" smtClean="0">
+        </p:grpSpPr>
+        <p:grpSp>
+          <p:nvGrpSpPr>
+            <p:cNvPr id="52" name="Group 51"/>
+            <p:cNvGrpSpPr>
+              <a:grpSpLocks noChangeAspect="1"/>
+            </p:cNvGrpSpPr>
+            <p:nvPr/>
+          </p:nvGrpSpPr>
+          <p:grpSpPr>
+            <a:xfrm>
+              <a:off x="847858" y="193618"/>
+              <a:ext cx="5781542" cy="5216582"/>
+              <a:chOff x="288307" y="457200"/>
+              <a:chExt cx="6544463" cy="5904955"/>
+            </a:xfrm>
+            <a:grpFill/>
+          </p:grpSpPr>
+          <p:grpSp>
+            <p:nvGrpSpPr>
+              <p:cNvPr id="39" name="Group 38"/>
+              <p:cNvGrpSpPr/>
+              <p:nvPr/>
+            </p:nvGrpSpPr>
+            <p:grpSpPr>
+              <a:xfrm>
+                <a:off x="288307" y="990600"/>
+                <a:ext cx="6544463" cy="5371555"/>
+                <a:chOff x="858564" y="-190656"/>
+                <a:chExt cx="6544463" cy="5371555"/>
+              </a:xfrm>
+              <a:grpFill/>
+            </p:grpSpPr>
+            <p:sp>
+              <p:nvSpPr>
+                <p:cNvPr id="4" name="Rounded Rectangle 3"/>
+                <p:cNvSpPr/>
+                <p:nvPr/>
+              </p:nvSpPr>
+              <p:spPr>
+                <a:xfrm rot="2483448">
+                  <a:off x="3033906" y="1259374"/>
+                  <a:ext cx="1676400" cy="2895600"/>
+                </a:xfrm>
+                <a:prstGeom prst="roundRect">
+                  <a:avLst/>
+                </a:prstGeom>
+                <a:grpFill/>
+              </p:spPr>
+              <p:style>
+                <a:lnRef idx="2">
+                  <a:schemeClr val="accent1">
+                    <a:shade val="50000"/>
+                  </a:schemeClr>
+                </a:lnRef>
+                <a:fillRef idx="1">
+                  <a:schemeClr val="accent1"/>
+                </a:fillRef>
+                <a:effectRef idx="0">
+                  <a:schemeClr val="accent1"/>
+                </a:effectRef>
+                <a:fontRef idx="minor">
+                  <a:schemeClr val="lt1"/>
+                </a:fontRef>
+              </p:style>
+              <p:txBody>
+                <a:bodyPr rtlCol="0" anchor="ctr"/>
+                <a:lstStyle/>
+                <a:p>
+                  <a:pPr algn="ctr"/>
+                  <a:endParaRPr lang="en-US"/>
+                </a:p>
+              </p:txBody>
+            </p:sp>
+            <p:sp>
+              <p:nvSpPr>
+                <p:cNvPr id="6" name="Rounded Rectangle 5"/>
+                <p:cNvSpPr/>
+                <p:nvPr/>
+              </p:nvSpPr>
+              <p:spPr>
+                <a:xfrm rot="2483448">
+                  <a:off x="2566546" y="1953753"/>
+                  <a:ext cx="277108" cy="953291"/>
+                </a:xfrm>
+                <a:prstGeom prst="roundRect">
+                  <a:avLst/>
+                </a:prstGeom>
+                <a:grpFill/>
+              </p:spPr>
+              <p:style>
+                <a:lnRef idx="2">
+                  <a:schemeClr val="accent1">
+                    <a:shade val="50000"/>
+                  </a:schemeClr>
+                </a:lnRef>
+                <a:fillRef idx="1">
+                  <a:schemeClr val="accent1"/>
+                </a:fillRef>
+                <a:effectRef idx="0">
+                  <a:schemeClr val="accent1"/>
+                </a:effectRef>
+                <a:fontRef idx="minor">
+                  <a:schemeClr val="lt1"/>
+                </a:fontRef>
+              </p:style>
+              <p:txBody>
+                <a:bodyPr rtlCol="0" anchor="ctr"/>
+                <a:lstStyle/>
+                <a:p>
+                  <a:pPr algn="ctr"/>
+                  <a:endParaRPr lang="en-US"/>
+                </a:p>
+              </p:txBody>
+            </p:sp>
+            <p:sp>
+              <p:nvSpPr>
+                <p:cNvPr id="7" name="Rounded Rectangle 6"/>
+                <p:cNvSpPr/>
+                <p:nvPr/>
+              </p:nvSpPr>
+              <p:spPr>
+                <a:xfrm rot="2483448">
+                  <a:off x="4166746" y="3325353"/>
+                  <a:ext cx="277108" cy="953291"/>
+                </a:xfrm>
+                <a:prstGeom prst="roundRect">
+                  <a:avLst/>
+                </a:prstGeom>
+                <a:grpFill/>
+              </p:spPr>
+              <p:style>
+                <a:lnRef idx="2">
+                  <a:schemeClr val="accent1">
+                    <a:shade val="50000"/>
+                  </a:schemeClr>
+                </a:lnRef>
+                <a:fillRef idx="1">
+                  <a:schemeClr val="accent1"/>
+                </a:fillRef>
+                <a:effectRef idx="0">
+                  <a:schemeClr val="accent1"/>
+                </a:effectRef>
+                <a:fontRef idx="minor">
+                  <a:schemeClr val="lt1"/>
+                </a:fontRef>
+              </p:style>
+              <p:txBody>
+                <a:bodyPr rtlCol="0" anchor="ctr"/>
+                <a:lstStyle/>
+                <a:p>
+                  <a:pPr algn="ctr"/>
+                  <a:endParaRPr lang="en-US"/>
+                </a:p>
+              </p:txBody>
+            </p:sp>
+            <p:cxnSp>
+              <p:nvCxnSpPr>
+                <p:cNvPr id="11" name="Straight Arrow Connector 10"/>
+                <p:cNvCxnSpPr/>
+                <p:nvPr/>
+              </p:nvCxnSpPr>
+              <p:spPr>
+                <a:xfrm flipV="1">
+                  <a:off x="1365164" y="228601"/>
+                  <a:ext cx="0" cy="4952298"/>
+                </a:xfrm>
+                <a:prstGeom prst="straightConnector1">
+                  <a:avLst/>
+                </a:prstGeom>
+                <a:grpFill/>
+                <a:ln w="28575">
+                  <a:solidFill>
+                    <a:schemeClr val="bg2"/>
+                  </a:solidFill>
+                  <a:tailEnd type="arrow"/>
+                </a:ln>
+              </p:spPr>
+              <p:style>
+                <a:lnRef idx="1">
+                  <a:schemeClr val="accent1"/>
+                </a:lnRef>
+                <a:fillRef idx="0">
+                  <a:schemeClr val="accent1"/>
+                </a:fillRef>
+                <a:effectRef idx="0">
+                  <a:schemeClr val="accent1"/>
+                </a:effectRef>
+                <a:fontRef idx="minor">
+                  <a:schemeClr val="tx1"/>
+                </a:fontRef>
+              </p:style>
+            </p:cxnSp>
+            <p:cxnSp>
+              <p:nvCxnSpPr>
+                <p:cNvPr id="12" name="Straight Arrow Connector 11"/>
+                <p:cNvCxnSpPr/>
+                <p:nvPr/>
+              </p:nvCxnSpPr>
+              <p:spPr>
+                <a:xfrm>
+                  <a:off x="1106399" y="4749619"/>
+                  <a:ext cx="6296628" cy="1"/>
+                </a:xfrm>
+                <a:prstGeom prst="straightConnector1">
+                  <a:avLst/>
+                </a:prstGeom>
+                <a:grpFill/>
+                <a:ln w="28575">
+                  <a:solidFill>
+                    <a:schemeClr val="bg2"/>
+                  </a:solidFill>
+                  <a:tailEnd type="arrow"/>
+                </a:ln>
+              </p:spPr>
+              <p:style>
+                <a:lnRef idx="1">
+                  <a:schemeClr val="accent1"/>
+                </a:lnRef>
+                <a:fillRef idx="0">
+                  <a:schemeClr val="accent1"/>
+                </a:fillRef>
+                <a:effectRef idx="0">
+                  <a:schemeClr val="accent1"/>
+                </a:effectRef>
+                <a:fontRef idx="minor">
+                  <a:schemeClr val="tx1"/>
+                </a:fontRef>
+              </p:style>
+            </p:cxnSp>
+            <p:cxnSp>
+              <p:nvCxnSpPr>
+                <p:cNvPr id="17" name="Straight Connector 16"/>
+                <p:cNvCxnSpPr/>
+                <p:nvPr/>
+              </p:nvCxnSpPr>
+              <p:spPr>
+                <a:xfrm flipV="1">
+                  <a:off x="3834009" y="201246"/>
+                  <a:ext cx="2" cy="4548375"/>
+                </a:xfrm>
+                <a:prstGeom prst="line">
+                  <a:avLst/>
+                </a:prstGeom>
+                <a:grpFill/>
+                <a:ln w="25400">
+                  <a:solidFill>
+                    <a:srgbClr val="FFC000"/>
+                  </a:solidFill>
+                  <a:prstDash val="dash"/>
+                </a:ln>
+              </p:spPr>
+              <p:style>
+                <a:lnRef idx="1">
+                  <a:schemeClr val="accent1"/>
+                </a:lnRef>
+                <a:fillRef idx="0">
+                  <a:schemeClr val="accent1"/>
+                </a:fillRef>
+                <a:effectRef idx="0">
+                  <a:schemeClr val="accent1"/>
+                </a:effectRef>
+                <a:fontRef idx="minor">
+                  <a:schemeClr val="tx1"/>
+                </a:fontRef>
+              </p:style>
+            </p:cxnSp>
+            <p:cxnSp>
+              <p:nvCxnSpPr>
+                <p:cNvPr id="23" name="Straight Connector 22"/>
+                <p:cNvCxnSpPr/>
+                <p:nvPr/>
+              </p:nvCxnSpPr>
+              <p:spPr>
+                <a:xfrm flipV="1">
+                  <a:off x="1365164" y="2717056"/>
+                  <a:ext cx="5779098" cy="6122"/>
+                </a:xfrm>
+                <a:prstGeom prst="line">
+                  <a:avLst/>
+                </a:prstGeom>
+                <a:grpFill/>
+                <a:ln w="25400">
+                  <a:solidFill>
+                    <a:srgbClr val="FFC000"/>
+                  </a:solidFill>
+                  <a:prstDash val="dash"/>
+                </a:ln>
+              </p:spPr>
+              <p:style>
+                <a:lnRef idx="1">
+                  <a:schemeClr val="accent1"/>
+                </a:lnRef>
+                <a:fillRef idx="0">
+                  <a:schemeClr val="accent1"/>
+                </a:fillRef>
+                <a:effectRef idx="0">
+                  <a:schemeClr val="accent1"/>
+                </a:effectRef>
+                <a:fontRef idx="minor">
+                  <a:schemeClr val="tx1"/>
+                </a:fontRef>
+              </p:style>
+            </p:cxnSp>
+            <p:sp>
+              <p:nvSpPr>
+                <p:cNvPr id="27" name="TextBox 26"/>
+                <p:cNvSpPr txBox="1"/>
+                <p:nvPr/>
+              </p:nvSpPr>
+              <p:spPr>
+                <a:xfrm>
+                  <a:off x="858564" y="2526268"/>
+                  <a:ext cx="420344" cy="369332"/>
+                </a:xfrm>
+                <a:prstGeom prst="rect">
+                  <a:avLst/>
+                </a:prstGeom>
+                <a:grpFill/>
+              </p:spPr>
+              <p:txBody>
+                <a:bodyPr wrap="square" rtlCol="0">
+                  <a:spAutoFit/>
+                </a:bodyPr>
+                <a:lstStyle/>
+                <a:p>
+                  <a:r>
+                    <a:rPr lang="en-US" dirty="0" smtClean="0">
+                      <a:solidFill>
+                        <a:schemeClr val="bg1"/>
+                      </a:solidFill>
+                    </a:rPr>
+                    <a:t>X</a:t>
+                  </a:r>
+                  <a:endParaRPr lang="en-US" dirty="0">
+                    <a:solidFill>
+                      <a:schemeClr val="bg1"/>
+                    </a:solidFill>
+                  </a:endParaRPr>
+                </a:p>
+              </p:txBody>
+            </p:sp>
+            <p:sp>
+              <p:nvSpPr>
+                <p:cNvPr id="28" name="TextBox 27"/>
+                <p:cNvSpPr txBox="1"/>
+                <p:nvPr/>
+              </p:nvSpPr>
+              <p:spPr>
+                <a:xfrm>
+                  <a:off x="3676028" y="4811567"/>
+                  <a:ext cx="420343" cy="369332"/>
+                </a:xfrm>
+                <a:prstGeom prst="rect">
+                  <a:avLst/>
+                </a:prstGeom>
+                <a:grpFill/>
+              </p:spPr>
+              <p:txBody>
+                <a:bodyPr wrap="square" rtlCol="0">
+                  <a:spAutoFit/>
+                </a:bodyPr>
+                <a:lstStyle/>
+                <a:p>
+                  <a:r>
+                    <a:rPr lang="en-US" dirty="0" smtClean="0">
+                      <a:solidFill>
+                        <a:schemeClr val="bg1"/>
+                      </a:solidFill>
+                    </a:rPr>
+                    <a:t>Y</a:t>
+                  </a:r>
+                </a:p>
+              </p:txBody>
+            </p:sp>
+            <p:sp>
+              <p:nvSpPr>
+                <p:cNvPr id="30" name="Arc 29"/>
+                <p:cNvSpPr/>
+                <p:nvPr/>
+              </p:nvSpPr>
+              <p:spPr>
+                <a:xfrm rot="2483827">
+                  <a:off x="2832198" y="1019354"/>
+                  <a:ext cx="2946204" cy="2765149"/>
+                </a:xfrm>
+                <a:prstGeom prst="arc">
+                  <a:avLst>
+                    <a:gd name="adj1" fmla="val 15906267"/>
+                    <a:gd name="adj2" fmla="val 19789987"/>
+                  </a:avLst>
+                </a:prstGeom>
+                <a:grpFill/>
+                <a:ln w="25400">
+                  <a:solidFill>
+                    <a:srgbClr val="FFC000"/>
+                  </a:solidFill>
+                </a:ln>
+              </p:spPr>
+              <p:style>
+                <a:lnRef idx="1">
+                  <a:schemeClr val="accent1"/>
+                </a:lnRef>
+                <a:fillRef idx="0">
+                  <a:schemeClr val="accent1"/>
+                </a:fillRef>
+                <a:effectRef idx="0">
+                  <a:schemeClr val="accent1"/>
+                </a:effectRef>
+                <a:fontRef idx="minor">
+                  <a:schemeClr val="tx1"/>
+                </a:fontRef>
+              </p:style>
+              <p:txBody>
+                <a:bodyPr rtlCol="0" anchor="ctr"/>
+                <a:lstStyle/>
+                <a:p>
+                  <a:pPr algn="ctr"/>
+                  <a:endParaRPr lang="en-US"/>
+                </a:p>
+              </p:txBody>
+            </p:sp>
+            <p:sp>
+              <p:nvSpPr>
+                <p:cNvPr id="31" name="TextBox 30"/>
+                <p:cNvSpPr txBox="1"/>
+                <p:nvPr/>
+              </p:nvSpPr>
+              <p:spPr>
+                <a:xfrm>
+                  <a:off x="5638800" y="1595735"/>
+                  <a:ext cx="420343" cy="461665"/>
+                </a:xfrm>
+                <a:prstGeom prst="rect">
+                  <a:avLst/>
+                </a:prstGeom>
+                <a:grpFill/>
+              </p:spPr>
+              <p:txBody>
+                <a:bodyPr wrap="square" rtlCol="0">
+                  <a:spAutoFit/>
+                </a:bodyPr>
+                <a:lstStyle/>
+                <a:p>
+                  <a:r>
+                    <a:rPr lang="el-GR" sz="2400" dirty="0" smtClean="0">
+                      <a:solidFill>
+                        <a:schemeClr val="bg1"/>
+                      </a:solidFill>
+                      <a:latin typeface="Times New Roman"/>
+                      <a:cs typeface="Times New Roman"/>
+                    </a:rPr>
+                    <a:t>Θ</a:t>
+                  </a:r>
+                  <a:endParaRPr lang="en-US" dirty="0">
+                    <a:solidFill>
+                      <a:schemeClr val="bg1"/>
+                    </a:solidFill>
+                  </a:endParaRPr>
+                </a:p>
+              </p:txBody>
+            </p:sp>
+            <p:sp>
+              <p:nvSpPr>
+                <p:cNvPr id="32" name="Arc 31"/>
+                <p:cNvSpPr>
+                  <a:spLocks noChangeAspect="1"/>
+                </p:cNvSpPr>
+                <p:nvPr/>
+              </p:nvSpPr>
+              <p:spPr>
+                <a:xfrm rot="21393980">
+                  <a:off x="1794366" y="-50878"/>
+                  <a:ext cx="4079285" cy="4370306"/>
+                </a:xfrm>
+                <a:prstGeom prst="arc">
+                  <a:avLst>
+                    <a:gd name="adj1" fmla="val 17486671"/>
+                    <a:gd name="adj2" fmla="val 19711374"/>
+                  </a:avLst>
+                </a:prstGeom>
+                <a:grpFill/>
+                <a:ln w="28575">
+                  <a:solidFill>
+                    <a:srgbClr val="92D050"/>
+                  </a:solidFill>
+                  <a:headEnd type="triangle" w="lg" len="lg"/>
+                  <a:tailEnd type="triangle" w="lg" len="lg"/>
+                </a:ln>
+              </p:spPr>
+              <p:style>
+                <a:lnRef idx="1">
+                  <a:schemeClr val="accent1"/>
+                </a:lnRef>
+                <a:fillRef idx="0">
+                  <a:schemeClr val="accent1"/>
+                </a:fillRef>
+                <a:effectRef idx="0">
+                  <a:schemeClr val="accent1"/>
+                </a:effectRef>
+                <a:fontRef idx="minor">
+                  <a:schemeClr val="tx1"/>
+                </a:fontRef>
+              </p:style>
+              <p:txBody>
+                <a:bodyPr rtlCol="0" anchor="ctr"/>
+                <a:lstStyle/>
+                <a:p>
+                  <a:pPr algn="ctr"/>
+                  <a:endParaRPr lang="en-US"/>
+                </a:p>
+              </p:txBody>
+            </p:sp>
+            <mc:AlternateContent xmlns:mc="http://schemas.openxmlformats.org/markup-compatibility/2006" xmlns:a14="http://schemas.microsoft.com/office/drawing/2010/main">
+              <mc:Choice Requires="a14">
+                <p:sp>
+                  <p:nvSpPr>
+                    <p:cNvPr id="33" name="TextBox 32"/>
+                    <p:cNvSpPr txBox="1"/>
+                    <p:nvPr/>
+                  </p:nvSpPr>
+                  <p:spPr>
+                    <a:xfrm>
+                      <a:off x="4334203" y="-190656"/>
+                      <a:ext cx="1676400" cy="391902"/>
+                    </a:xfrm>
+                    <a:prstGeom prst="rect">
+                      <a:avLst/>
+                    </a:prstGeom>
+                    <a:grpFill/>
+                  </p:spPr>
+                  <p:txBody>
+                    <a:bodyPr wrap="square" rtlCol="0">
+                      <a:spAutoFit/>
+                    </a:bodyPr>
+                    <a:lstStyle/>
+                    <a:p>
+                      <a:pPr/>
+                      <a14:m>
+                        <m:oMathPara xmlns:m="http://schemas.openxmlformats.org/officeDocument/2006/math">
+                          <m:oMathParaPr>
+                            <m:jc m:val="centerGroup"/>
+                          </m:oMathParaPr>
+                          <m:oMath xmlns:m="http://schemas.openxmlformats.org/officeDocument/2006/math">
+                            <m:sSub>
+                              <m:sSubPr>
+                                <m:ctrlPr>
+                                  <a:rPr lang="en-US" b="0" i="1" smtClean="0">
+                                    <a:solidFill>
+                                      <a:schemeClr val="bg1"/>
+                                    </a:solidFill>
+                                    <a:latin typeface="Cambria Math"/>
+                                  </a:rPr>
+                                </m:ctrlPr>
+                              </m:sSubPr>
+                              <m:e>
+                                <m:r>
+                                  <a:rPr lang="en-US" b="0" i="1" smtClean="0">
+                                    <a:solidFill>
+                                      <a:schemeClr val="bg1"/>
+                                    </a:solidFill>
+                                    <a:latin typeface="Cambria Math"/>
+                                  </a:rPr>
+                                  <m:t>𝑉</m:t>
+                                </m:r>
+                              </m:e>
+                              <m:sub>
+                                <m:r>
+                                  <a:rPr lang="en-US" b="0" i="1" smtClean="0">
+                                    <a:solidFill>
+                                      <a:schemeClr val="bg1"/>
+                                    </a:solidFill>
+                                    <a:latin typeface="Cambria Math"/>
+                                  </a:rPr>
+                                  <m:t>𝐴𝑛𝑔𝑢𝑙𝑎𝑟</m:t>
+                                </m:r>
+                              </m:sub>
+                            </m:sSub>
+                          </m:oMath>
+                        </m:oMathPara>
+                      </a14:m>
+                      <a:endParaRPr lang="en-US" dirty="0">
+                        <a:solidFill>
+                          <a:schemeClr val="bg1"/>
+                        </a:solidFill>
+                      </a:endParaRPr>
+                    </a:p>
+                  </p:txBody>
+                </p:sp>
+              </mc:Choice>
+              <mc:Fallback xmlns="">
+                <p:sp>
+                  <p:nvSpPr>
+                    <p:cNvPr id="33" name="TextBox 32"/>
+                    <p:cNvSpPr txBox="1">
+                      <a:spLocks noRot="1" noChangeAspect="1" noMove="1" noResize="1" noEditPoints="1" noAdjustHandles="1" noChangeArrowheads="1" noChangeShapeType="1" noTextEdit="1"/>
+                    </p:cNvSpPr>
+                    <p:nvPr/>
+                  </p:nvSpPr>
+                  <p:spPr>
+                    <a:xfrm>
+                      <a:off x="4334203" y="-190656"/>
+                      <a:ext cx="1676400" cy="391902"/>
+                    </a:xfrm>
+                    <a:prstGeom prst="rect">
+                      <a:avLst/>
+                    </a:prstGeom>
+                    <a:blipFill rotWithShape="1">
+                      <a:blip r:embed="rId4"/>
+                      <a:stretch>
+                        <a:fillRect b="-22807"/>
+                      </a:stretch>
+                    </a:blipFill>
+                  </p:spPr>
+                  <p:txBody>
+                    <a:bodyPr/>
+                    <a:lstStyle/>
+                    <a:p>
+                      <a:r>
+                        <a:rPr lang="en-US">
+                          <a:noFill/>
+                        </a:rPr>
+                        <a:t> </a:t>
+                      </a:r>
+                    </a:p>
+                  </p:txBody>
+                </p:sp>
+              </mc:Fallback>
+            </mc:AlternateContent>
+            <p:cxnSp>
+              <p:nvCxnSpPr>
+                <p:cNvPr id="35" name="Straight Connector 34"/>
+                <p:cNvCxnSpPr/>
+                <p:nvPr/>
+              </p:nvCxnSpPr>
+              <p:spPr>
+                <a:xfrm flipH="1">
+                  <a:off x="3834011" y="385825"/>
+                  <a:ext cx="2225132" cy="2337353"/>
+                </a:xfrm>
+                <a:prstGeom prst="line">
+                  <a:avLst/>
+                </a:prstGeom>
+                <a:grpFill/>
+                <a:ln w="25400">
+                  <a:solidFill>
+                    <a:srgbClr val="92D050"/>
+                  </a:solidFill>
+                  <a:headEnd type="triangle" w="lg" len="lg"/>
+                  <a:tailEnd type="none" w="lg" len="lg"/>
+                </a:ln>
+              </p:spPr>
+              <p:style>
+                <a:lnRef idx="1">
+                  <a:schemeClr val="accent1"/>
+                </a:lnRef>
+                <a:fillRef idx="0">
+                  <a:schemeClr val="accent1"/>
+                </a:fillRef>
+                <a:effectRef idx="0">
+                  <a:schemeClr val="accent1"/>
+                </a:effectRef>
+                <a:fontRef idx="minor">
+                  <a:schemeClr val="tx1"/>
+                </a:fontRef>
+              </p:style>
+            </p:cxnSp>
+            <mc:AlternateContent xmlns:mc="http://schemas.openxmlformats.org/markup-compatibility/2006" xmlns:a14="http://schemas.microsoft.com/office/drawing/2010/main">
+              <mc:Choice Requires="a14">
+                <p:sp>
+                  <p:nvSpPr>
+                    <p:cNvPr id="38" name="TextBox 37"/>
+                    <p:cNvSpPr txBox="1"/>
+                    <p:nvPr/>
+                  </p:nvSpPr>
+                  <p:spPr>
+                    <a:xfrm rot="18714884">
+                      <a:off x="4876605" y="808773"/>
+                      <a:ext cx="1676400" cy="369332"/>
+                    </a:xfrm>
+                    <a:prstGeom prst="rect">
+                      <a:avLst/>
+                    </a:prstGeom>
+                    <a:grpFill/>
+                  </p:spPr>
+                  <p:txBody>
+                    <a:bodyPr wrap="square" rtlCol="0">
+                      <a:spAutoFit/>
+                    </a:bodyPr>
+                    <a:lstStyle/>
+                    <a:p>
+                      <a:pPr/>
+                      <a14:m>
+                        <m:oMathPara xmlns:m="http://schemas.openxmlformats.org/officeDocument/2006/math">
+                          <m:oMathParaPr>
+                            <m:jc m:val="centerGroup"/>
+                          </m:oMathParaPr>
+                          <m:oMath xmlns:m="http://schemas.openxmlformats.org/officeDocument/2006/math">
+                            <m:sSub>
+                              <m:sSubPr>
+                                <m:ctrlPr>
+                                  <a:rPr lang="en-US" b="0" i="1" smtClean="0">
+                                    <a:solidFill>
+                                      <a:schemeClr val="bg1"/>
+                                    </a:solidFill>
+                                    <a:latin typeface="Cambria Math"/>
+                                  </a:rPr>
+                                </m:ctrlPr>
+                              </m:sSubPr>
+                              <m:e>
+                                <m:r>
+                                  <a:rPr lang="en-US" b="0" i="1" smtClean="0">
+                                    <a:solidFill>
+                                      <a:schemeClr val="bg1"/>
+                                    </a:solidFill>
+                                    <a:latin typeface="Cambria Math"/>
+                                  </a:rPr>
+                                  <m:t>𝑉</m:t>
+                                </m:r>
+                              </m:e>
+                              <m:sub>
+                                <m:r>
+                                  <a:rPr lang="en-US" b="0" i="1" smtClean="0">
+                                    <a:solidFill>
+                                      <a:schemeClr val="bg1"/>
+                                    </a:solidFill>
+                                    <a:latin typeface="Cambria Math"/>
+                                  </a:rPr>
+                                  <m:t>𝐿𝑖𝑛𝑒𝑎𝑟</m:t>
+                                </m:r>
+                              </m:sub>
+                            </m:sSub>
+                          </m:oMath>
+                        </m:oMathPara>
+                      </a14:m>
+                      <a:endParaRPr lang="en-US" dirty="0">
+                        <a:solidFill>
+                          <a:schemeClr val="bg1"/>
+                        </a:solidFill>
+                      </a:endParaRPr>
+                    </a:p>
+                  </p:txBody>
+                </p:sp>
+              </mc:Choice>
+              <mc:Fallback xmlns="">
+                <p:sp>
+                  <p:nvSpPr>
+                    <p:cNvPr id="38" name="TextBox 37"/>
+                    <p:cNvSpPr txBox="1">
+                      <a:spLocks noRot="1" noChangeAspect="1" noMove="1" noResize="1" noEditPoints="1" noAdjustHandles="1" noChangeArrowheads="1" noChangeShapeType="1" noTextEdit="1"/>
+                    </p:cNvSpPr>
+                    <p:nvPr/>
+                  </p:nvSpPr>
+                  <p:spPr>
+                    <a:xfrm rot="18714884">
+                      <a:off x="4876605" y="808773"/>
+                      <a:ext cx="1676400" cy="369332"/>
+                    </a:xfrm>
+                    <a:prstGeom prst="rect">
+                      <a:avLst/>
+                    </a:prstGeom>
+                    <a:blipFill rotWithShape="1">
+                      <a:blip r:embed="rId5"/>
+                      <a:stretch>
+                        <a:fillRect/>
+                      </a:stretch>
+                    </a:blipFill>
+                  </p:spPr>
+                  <p:txBody>
+                    <a:bodyPr/>
+                    <a:lstStyle/>
+                    <a:p>
+                      <a:r>
+                        <a:rPr lang="en-US">
+                          <a:noFill/>
+                        </a:rPr>
+                        <a:t> </a:t>
+                      </a:r>
+                    </a:p>
+                  </p:txBody>
+                </p:sp>
+              </mc:Fallback>
+            </mc:AlternateContent>
+          </p:grpSp>
+          <p:cxnSp>
+            <p:nvCxnSpPr>
+              <p:cNvPr id="40" name="Straight Connector 39"/>
+              <p:cNvCxnSpPr/>
+              <p:nvPr/>
+            </p:nvCxnSpPr>
+            <p:spPr>
+              <a:xfrm flipV="1">
+                <a:off x="3263753" y="457200"/>
+                <a:ext cx="890390" cy="3434990"/>
+              </a:xfrm>
+              <a:prstGeom prst="line">
+                <a:avLst/>
+              </a:prstGeom>
+              <a:grpFill/>
+              <a:ln w="25400">
+                <a:solidFill>
+                  <a:schemeClr val="tx1">
+                    <a:lumMod val="85000"/>
+                    <a:lumOff val="15000"/>
+                  </a:schemeClr>
+                </a:solidFill>
+                <a:headEnd type="none" w="lg" len="lg"/>
+                <a:tailEnd type="triangle" w="lg" len="lg"/>
+              </a:ln>
+            </p:spPr>
+            <p:style>
+              <a:lnRef idx="1">
+                <a:schemeClr val="accent1"/>
+              </a:lnRef>
+              <a:fillRef idx="0">
+                <a:schemeClr val="accent1"/>
+              </a:fillRef>
+              <a:effectRef idx="0">
+                <a:schemeClr val="accent1"/>
+              </a:effectRef>
+              <a:fontRef idx="minor">
+                <a:schemeClr val="tx1"/>
+              </a:fontRef>
+            </p:style>
+          </p:cxnSp>
+          <mc:AlternateContent xmlns:mc="http://schemas.openxmlformats.org/markup-compatibility/2006" xmlns:a14="http://schemas.microsoft.com/office/drawing/2010/main">
+            <mc:Choice Requires="a14">
+              <p:sp>
+                <p:nvSpPr>
+                  <p:cNvPr id="44" name="TextBox 43"/>
+                  <p:cNvSpPr txBox="1"/>
+                  <p:nvPr/>
+                </p:nvSpPr>
+                <p:spPr>
+                  <a:xfrm rot="17074639">
+                    <a:off x="2739902" y="1382415"/>
+                    <a:ext cx="1676400" cy="369332"/>
+                  </a:xfrm>
+                  <a:prstGeom prst="rect">
+                    <a:avLst/>
+                  </a:prstGeom>
+                  <a:grpFill/>
+                </p:spPr>
+                <p:txBody>
+                  <a:bodyPr wrap="square" rtlCol="0">
+                    <a:spAutoFit/>
+                  </a:bodyPr>
+                  <a:lstStyle/>
+                  <a:p>
+                    <a:pPr/>
+                    <a14:m>
+                      <m:oMathPara xmlns:m="http://schemas.openxmlformats.org/officeDocument/2006/math">
+                        <m:oMathParaPr>
+                          <m:jc m:val="centerGroup"/>
+                        </m:oMathParaPr>
+                        <m:oMath xmlns:m="http://schemas.openxmlformats.org/officeDocument/2006/math">
+                          <m:r>
+                            <a:rPr lang="en-US" b="0" i="1" smtClean="0">
+                              <a:solidFill>
+                                <a:schemeClr val="bg1"/>
+                              </a:solidFill>
+                              <a:latin typeface="Cambria Math"/>
+                            </a:rPr>
+                            <m:t>𝑉</m:t>
+                          </m:r>
+                        </m:oMath>
+                      </m:oMathPara>
+                    </a14:m>
+                    <a:endParaRPr lang="en-US" dirty="0">
+                      <a:solidFill>
+                        <a:schemeClr val="bg1"/>
+                      </a:solidFill>
+                    </a:endParaRPr>
+                  </a:p>
+                </p:txBody>
+              </p:sp>
+            </mc:Choice>
+            <mc:Fallback xmlns="">
+              <p:sp>
+                <p:nvSpPr>
+                  <p:cNvPr id="44" name="TextBox 43"/>
+                  <p:cNvSpPr txBox="1">
+                    <a:spLocks noRot="1" noChangeAspect="1" noMove="1" noResize="1" noEditPoints="1" noAdjustHandles="1" noChangeArrowheads="1" noChangeShapeType="1" noTextEdit="1"/>
+                  </p:cNvSpPr>
+                  <p:nvPr/>
+                </p:nvSpPr>
+                <p:spPr>
+                  <a:xfrm rot="17074639">
+                    <a:off x="2739902" y="1382415"/>
+                    <a:ext cx="1676400" cy="369332"/>
+                  </a:xfrm>
+                  <a:prstGeom prst="rect">
+                    <a:avLst/>
+                  </a:prstGeom>
+                  <a:blipFill rotWithShape="1">
+                    <a:blip r:embed="rId6"/>
+                    <a:stretch>
+                      <a:fillRect/>
+                    </a:stretch>
+                  </a:blipFill>
+                </p:spPr>
+                <p:txBody>
+                  <a:bodyPr/>
+                  <a:lstStyle/>
+                  <a:p>
+                    <a:r>
+                      <a:rPr lang="en-US">
+                        <a:noFill/>
+                      </a:rPr>
+                      <a:t> </a:t>
+                    </a:r>
+                  </a:p>
+                </p:txBody>
+              </p:sp>
+            </mc:Fallback>
+          </mc:AlternateContent>
+        </p:grpSp>
+        <p:sp>
+          <p:nvSpPr>
+            <p:cNvPr id="53" name="Arc 52"/>
+            <p:cNvSpPr>
+              <a:spLocks/>
+            </p:cNvSpPr>
+            <p:nvPr/>
+          </p:nvSpPr>
+          <p:spPr>
+            <a:xfrm rot="2453611">
+              <a:off x="4017833" y="3909882"/>
+              <a:ext cx="189392" cy="938343"/>
+            </a:xfrm>
+            <a:prstGeom prst="arc">
+              <a:avLst>
+                <a:gd name="adj1" fmla="val 625245"/>
+                <a:gd name="adj2" fmla="val 20154452"/>
+              </a:avLst>
+            </a:prstGeom>
+            <a:grpFill/>
+            <a:ln w="28575">
+              <a:solidFill>
+                <a:srgbClr val="92D050"/>
+              </a:solidFill>
+              <a:headEnd type="none" w="lg" len="lg"/>
+              <a:tailEnd type="triangle" w="lg" len="lg"/>
+            </a:ln>
+          </p:spPr>
+          <p:style>
+            <a:lnRef idx="1">
+              <a:schemeClr val="accent1"/>
+            </a:lnRef>
+            <a:fillRef idx="0">
+              <a:schemeClr val="accent1"/>
+            </a:fillRef>
+            <a:effectRef idx="0">
+              <a:schemeClr val="accent1"/>
+            </a:effectRef>
+            <a:fontRef idx="minor">
+              <a:schemeClr val="tx1"/>
+            </a:fontRef>
+          </p:style>
+          <p:txBody>
+            <a:bodyPr rtlCol="0" anchor="ctr"/>
+            <a:lstStyle/>
+            <a:p>
+              <a:pPr algn="ctr"/>
+              <a:endParaRPr lang="en-US"/>
+            </a:p>
+          </p:txBody>
+        </p:sp>
+        <p:sp>
+          <p:nvSpPr>
+            <p:cNvPr id="54" name="Arc 53"/>
+            <p:cNvSpPr>
+              <a:spLocks/>
+            </p:cNvSpPr>
+            <p:nvPr/>
+          </p:nvSpPr>
+          <p:spPr>
+            <a:xfrm rot="2453611">
+              <a:off x="2189032" y="2318384"/>
+              <a:ext cx="189392" cy="938343"/>
+            </a:xfrm>
+            <a:prstGeom prst="arc">
+              <a:avLst>
+                <a:gd name="adj1" fmla="val 625245"/>
+                <a:gd name="adj2" fmla="val 20154452"/>
+              </a:avLst>
+            </a:prstGeom>
+            <a:grpFill/>
+            <a:ln w="28575">
+              <a:solidFill>
+                <a:srgbClr val="92D050"/>
+              </a:solidFill>
+              <a:headEnd type="none" w="lg" len="lg"/>
+              <a:tailEnd type="triangle" w="lg" len="lg"/>
+            </a:ln>
+          </p:spPr>
+          <p:style>
+            <a:lnRef idx="1">
+              <a:schemeClr val="accent1"/>
+            </a:lnRef>
+            <a:fillRef idx="0">
+              <a:schemeClr val="accent1"/>
+            </a:fillRef>
+            <a:effectRef idx="0">
+              <a:schemeClr val="accent1"/>
+            </a:effectRef>
+            <a:fontRef idx="minor">
+              <a:schemeClr val="tx1"/>
+            </a:fontRef>
+          </p:style>
+          <p:txBody>
+            <a:bodyPr rtlCol="0" anchor="ctr"/>
+            <a:lstStyle/>
+            <a:p>
+              <a:pPr algn="ctr"/>
+              <a:endParaRPr lang="en-US"/>
+            </a:p>
+          </p:txBody>
+        </p:sp>
+        <mc:AlternateContent xmlns:mc="http://schemas.openxmlformats.org/markup-compatibility/2006" xmlns:a14="http://schemas.microsoft.com/office/drawing/2010/main">
+          <mc:Choice Requires="a14">
+            <p:sp>
+              <p:nvSpPr>
+                <p:cNvPr id="55" name="TextBox 54"/>
+                <p:cNvSpPr txBox="1"/>
+                <p:nvPr/>
+              </p:nvSpPr>
+              <p:spPr>
+                <a:xfrm>
+                  <a:off x="3700692" y="4494218"/>
+                  <a:ext cx="1480974" cy="391902"/>
+                </a:xfrm>
+                <a:prstGeom prst="rect">
+                  <a:avLst/>
+                </a:prstGeom>
+                <a:grpFill/>
+              </p:spPr>
+              <p:txBody>
+                <a:bodyPr wrap="square" rtlCol="0">
+                  <a:spAutoFit/>
+                </a:bodyPr>
+                <a:lstStyle/>
+                <a:p>
+                  <a:pPr/>
+                  <a14:m>
+                    <m:oMathPara xmlns:m="http://schemas.openxmlformats.org/officeDocument/2006/math">
+                      <m:oMathParaPr>
+                        <m:jc m:val="centerGroup"/>
+                      </m:oMathParaPr>
+                      <m:oMath xmlns:m="http://schemas.openxmlformats.org/officeDocument/2006/math">
+                        <m:sSub>
+                          <m:sSubPr>
+                            <m:ctrlPr>
+                              <a:rPr lang="en-US" b="0" i="1" smtClean="0">
+                                <a:solidFill>
+                                  <a:schemeClr val="bg1"/>
+                                </a:solidFill>
+                                <a:latin typeface="Cambria Math"/>
+                              </a:rPr>
+                            </m:ctrlPr>
+                          </m:sSubPr>
+                          <m:e>
+                            <m:r>
+                              <a:rPr lang="en-US" b="0" i="1" smtClean="0">
+                                <a:solidFill>
+                                  <a:schemeClr val="bg1"/>
+                                </a:solidFill>
+                                <a:latin typeface="Cambria Math"/>
+                              </a:rPr>
+                              <m:t>𝑉</m:t>
+                            </m:r>
+                          </m:e>
+                          <m:sub>
+                            <m:r>
+                              <a:rPr lang="en-US" b="0" i="1" smtClean="0">
+                                <a:solidFill>
+                                  <a:schemeClr val="bg1"/>
+                                </a:solidFill>
+                                <a:latin typeface="Cambria Math"/>
+                              </a:rPr>
+                              <m:t>𝑅𝑖𝑔h𝑡</m:t>
+                            </m:r>
+                          </m:sub>
+                        </m:sSub>
+                      </m:oMath>
+                    </m:oMathPara>
+                  </a14:m>
+                  <a:endParaRPr lang="en-US" dirty="0">
+                    <a:solidFill>
+                      <a:schemeClr val="bg1"/>
+                    </a:solidFill>
+                  </a:endParaRPr>
+                </a:p>
+              </p:txBody>
+            </p:sp>
+          </mc:Choice>
+          <mc:Fallback xmlns="">
+            <p:sp>
+              <p:nvSpPr>
+                <p:cNvPr id="55" name="TextBox 54"/>
+                <p:cNvSpPr txBox="1">
+                  <a:spLocks noRot="1" noChangeAspect="1" noMove="1" noResize="1" noEditPoints="1" noAdjustHandles="1" noChangeArrowheads="1" noChangeShapeType="1" noTextEdit="1"/>
+                </p:cNvSpPr>
+                <p:nvPr/>
+              </p:nvSpPr>
+              <p:spPr>
+                <a:xfrm>
+                  <a:off x="3700692" y="4494218"/>
+                  <a:ext cx="1480974" cy="391902"/>
+                </a:xfrm>
+                <a:prstGeom prst="rect">
+                  <a:avLst/>
+                </a:prstGeom>
+                <a:blipFill rotWithShape="1">
+                  <a:blip r:embed="rId7"/>
+                  <a:stretch>
+                    <a:fillRect b="-9231"/>
+                  </a:stretch>
+                </a:blipFill>
+              </p:spPr>
+              <p:txBody>
+                <a:bodyPr/>
+                <a:lstStyle/>
+                <a:p>
+                  <a:r>
+                    <a:rPr lang="en-US">
+                      <a:noFill/>
+                    </a:rPr>
+                    <a:t> </a:t>
+                  </a:r>
+                </a:p>
+              </p:txBody>
+            </p:sp>
+          </mc:Fallback>
+        </mc:AlternateContent>
+        <mc:AlternateContent xmlns:mc="http://schemas.openxmlformats.org/markup-compatibility/2006" xmlns:a14="http://schemas.microsoft.com/office/drawing/2010/main">
+          <mc:Choice Requires="a14">
+            <p:sp>
+              <p:nvSpPr>
+                <p:cNvPr id="56" name="TextBox 55"/>
+                <p:cNvSpPr txBox="1"/>
+                <p:nvPr/>
+              </p:nvSpPr>
+              <p:spPr>
+                <a:xfrm>
+                  <a:off x="1066800" y="2580218"/>
+                  <a:ext cx="1480974" cy="391582"/>
+                </a:xfrm>
+                <a:prstGeom prst="rect">
+                  <a:avLst/>
+                </a:prstGeom>
+                <a:grpFill/>
+              </p:spPr>
+              <p:txBody>
+                <a:bodyPr wrap="square" rtlCol="0">
+                  <a:spAutoFit/>
+                </a:bodyPr>
+                <a:lstStyle/>
+                <a:p>
+                  <a:pPr/>
+                  <a14:m>
+                    <m:oMathPara xmlns:m="http://schemas.openxmlformats.org/officeDocument/2006/math">
+                      <m:oMathParaPr>
+                        <m:jc m:val="centerGroup"/>
+                      </m:oMathParaPr>
+                      <m:oMath xmlns:m="http://schemas.openxmlformats.org/officeDocument/2006/math">
+                        <m:sSub>
+                          <m:sSubPr>
+                            <m:ctrlPr>
+                              <a:rPr lang="en-US" b="0" i="1" smtClean="0">
+                                <a:solidFill>
+                                  <a:schemeClr val="bg1"/>
+                                </a:solidFill>
+                                <a:latin typeface="Cambria Math"/>
+                              </a:rPr>
+                            </m:ctrlPr>
+                          </m:sSubPr>
+                          <m:e>
+                            <m:r>
+                              <a:rPr lang="en-US" b="0" i="1" smtClean="0">
+                                <a:solidFill>
+                                  <a:schemeClr val="bg1"/>
+                                </a:solidFill>
+                                <a:latin typeface="Cambria Math"/>
+                              </a:rPr>
+                              <m:t>𝑉</m:t>
+                            </m:r>
+                          </m:e>
+                          <m:sub>
+                            <m:r>
+                              <a:rPr lang="en-US" b="0" i="1" smtClean="0">
+                                <a:solidFill>
+                                  <a:schemeClr val="bg1"/>
+                                </a:solidFill>
+                                <a:latin typeface="Cambria Math"/>
+                              </a:rPr>
+                              <m:t>𝐿𝑒𝑓𝑡</m:t>
+                            </m:r>
+                          </m:sub>
+                        </m:sSub>
+                      </m:oMath>
+                    </m:oMathPara>
+                  </a14:m>
+                  <a:endParaRPr lang="en-US" dirty="0">
+                    <a:solidFill>
+                      <a:schemeClr val="bg1"/>
+                    </a:solidFill>
+                  </a:endParaRPr>
+                </a:p>
+              </p:txBody>
+            </p:sp>
+          </mc:Choice>
+          <mc:Fallback xmlns="">
+            <p:sp>
+              <p:nvSpPr>
+                <p:cNvPr id="56" name="TextBox 55"/>
+                <p:cNvSpPr txBox="1">
+                  <a:spLocks noRot="1" noChangeAspect="1" noMove="1" noResize="1" noEditPoints="1" noAdjustHandles="1" noChangeArrowheads="1" noChangeShapeType="1" noTextEdit="1"/>
+                </p:cNvSpPr>
+                <p:nvPr/>
+              </p:nvSpPr>
+              <p:spPr>
+                <a:xfrm>
+                  <a:off x="1066800" y="2580218"/>
+                  <a:ext cx="1480974" cy="391582"/>
+                </a:xfrm>
+                <a:prstGeom prst="rect">
+                  <a:avLst/>
+                </a:prstGeom>
+                <a:blipFill rotWithShape="1">
+                  <a:blip r:embed="rId8"/>
+                  <a:stretch>
+                    <a:fillRect b="-7692"/>
+                  </a:stretch>
+                </a:blipFill>
+              </p:spPr>
+              <p:txBody>
+                <a:bodyPr/>
+                <a:lstStyle/>
+                <a:p>
+                  <a:r>
+                    <a:rPr lang="en-US">
+                      <a:noFill/>
+                    </a:rPr>
+                    <a:t> </a:t>
+                  </a:r>
+                </a:p>
+              </p:txBody>
+            </p:sp>
+          </mc:Fallback>
+        </mc:AlternateContent>
+        <p:sp>
+          <p:nvSpPr>
+            <p:cNvPr id="66" name="Arc 65"/>
+            <p:cNvSpPr/>
+            <p:nvPr/>
+          </p:nvSpPr>
+          <p:spPr>
+            <a:xfrm rot="2483827">
+              <a:off x="2920925" y="354608"/>
+              <a:ext cx="2602750" cy="2442800"/>
+            </a:xfrm>
+            <a:prstGeom prst="arc">
+              <a:avLst>
+                <a:gd name="adj1" fmla="val 14491520"/>
+                <a:gd name="adj2" fmla="val 17166175"/>
+              </a:avLst>
+            </a:prstGeom>
+            <a:grpFill/>
+            <a:ln w="25400">
+              <a:solidFill>
+                <a:srgbClr val="FFC000"/>
+              </a:solidFill>
+            </a:ln>
+          </p:spPr>
+          <p:style>
+            <a:lnRef idx="1">
+              <a:schemeClr val="accent1"/>
+            </a:lnRef>
+            <a:fillRef idx="0">
+              <a:schemeClr val="accent1"/>
+            </a:fillRef>
+            <a:effectRef idx="0">
+              <a:schemeClr val="accent1"/>
+            </a:effectRef>
+            <a:fontRef idx="minor">
+              <a:schemeClr val="tx1"/>
+            </a:fontRef>
+          </p:style>
+          <p:txBody>
+            <a:bodyPr rtlCol="0" anchor="ctr"/>
+            <a:lstStyle/>
+            <a:p>
+              <a:pPr algn="ctr"/>
+              <a:endParaRPr lang="en-US"/>
+            </a:p>
+          </p:txBody>
+        </p:sp>
+        <p:sp>
+          <p:nvSpPr>
+            <p:cNvPr id="67" name="TextBox 66"/>
+            <p:cNvSpPr txBox="1"/>
+            <p:nvPr/>
+          </p:nvSpPr>
+          <p:spPr>
+            <a:xfrm>
+              <a:off x="4885167" y="212482"/>
+              <a:ext cx="371342" cy="461665"/>
+            </a:xfrm>
+            <a:prstGeom prst="rect">
+              <a:avLst/>
+            </a:prstGeom>
+            <a:grpFill/>
+          </p:spPr>
+          <p:txBody>
+            <a:bodyPr wrap="square" rtlCol="0">
+              <a:spAutoFit/>
+            </a:bodyPr>
+            <a:lstStyle/>
+            <a:p>
+              <a:r>
+                <a:rPr lang="el-GR" sz="2400" dirty="0" smtClean="0">
+                  <a:solidFill>
+                    <a:schemeClr val="bg1"/>
+                  </a:solidFill>
+                  <a:latin typeface="Times New Roman"/>
+                  <a:cs typeface="Times New Roman"/>
+                </a:rPr>
+                <a:t>α</a:t>
+              </a:r>
+              <a:endParaRPr lang="en-US" dirty="0">
                 <a:solidFill>
                   <a:schemeClr val="bg1"/>
                 </a:solidFill>
-                <a:latin typeface="Times New Roman"/>
-                <a:cs typeface="Times New Roman"/>
-              </a:rPr>
-              <a:t>α</a:t>
-            </a:r>
-            <a:endParaRPr lang="en-US" dirty="0">
-              <a:solidFill>
-                <a:schemeClr val="bg1"/>
-              </a:solidFill>
-            </a:endParaRPr>
-          </a:p>
-        </p:txBody>
-      </p:sp>
+              </a:endParaRPr>
+            </a:p>
+          </p:txBody>
+        </p:sp>
+      </p:grpSp>
     </p:spTree>
     <p:extLst>
       <p:ext uri="{BB962C8B-B14F-4D97-AF65-F5344CB8AC3E}">

</xml_diff>